<commit_message>
Mise a jour du diapo de la soutenance
</commit_message>
<xml_diff>
--- a/Soutenance/soutenance-projet-co.pptx
+++ b/Soutenance/soutenance-projet-co.pptx
@@ -5,17 +5,26 @@
     <p:sldMasterId id="2147484055" r:id="rId4"/>
   </p:sldMasterIdLst>
   <p:notesMasterIdLst>
-    <p:notesMasterId r:id="rId13"/>
+    <p:notesMasterId r:id="rId22"/>
   </p:notesMasterIdLst>
   <p:sldIdLst>
     <p:sldId id="259" r:id="rId5"/>
     <p:sldId id="266" r:id="rId6"/>
     <p:sldId id="267" r:id="rId7"/>
-    <p:sldId id="268" r:id="rId8"/>
-    <p:sldId id="269" r:id="rId9"/>
-    <p:sldId id="273" r:id="rId10"/>
-    <p:sldId id="271" r:id="rId11"/>
-    <p:sldId id="272" r:id="rId12"/>
+    <p:sldId id="274" r:id="rId8"/>
+    <p:sldId id="275" r:id="rId9"/>
+    <p:sldId id="276" r:id="rId10"/>
+    <p:sldId id="277" r:id="rId11"/>
+    <p:sldId id="278" r:id="rId12"/>
+    <p:sldId id="279" r:id="rId13"/>
+    <p:sldId id="280" r:id="rId14"/>
+    <p:sldId id="288" r:id="rId15"/>
+    <p:sldId id="282" r:id="rId16"/>
+    <p:sldId id="287" r:id="rId17"/>
+    <p:sldId id="269" r:id="rId18"/>
+    <p:sldId id="273" r:id="rId19"/>
+    <p:sldId id="271" r:id="rId20"/>
+    <p:sldId id="272" r:id="rId21"/>
   </p:sldIdLst>
   <p:sldSz cx="9144000" cy="6858000" type="screen4x3"/>
   <p:notesSz cx="7099300" cy="10234613"/>
@@ -254,7 +263,7 @@
               <a:pPr>
                 <a:defRPr/>
               </a:pPr>
-              <a:t>04/06/2012</a:t>
+              <a:t>05/06/2012</a:t>
             </a:fld>
             <a:endParaRPr lang="fr-FR"/>
           </a:p>
@@ -580,6 +589,347 @@
 </p:notesMaster>
 </file>
 
+<file path=ppt/notesSlides/notesSlide1.xml><?xml version="1.0" encoding="utf-8"?>
+<p:notes xmlns:a="http://schemas.openxmlformats.org/drawingml/2006/main" xmlns:r="http://schemas.openxmlformats.org/officeDocument/2006/relationships" xmlns:p="http://schemas.openxmlformats.org/presentationml/2006/main">
+  <p:cSld>
+    <p:spTree>
+      <p:nvGrpSpPr>
+        <p:cNvPr id="1" name=""/>
+        <p:cNvGrpSpPr/>
+        <p:nvPr/>
+      </p:nvGrpSpPr>
+      <p:grpSpPr>
+        <a:xfrm>
+          <a:off x="0" y="0"/>
+          <a:ext cx="0" cy="0"/>
+          <a:chOff x="0" y="0"/>
+          <a:chExt cx="0" cy="0"/>
+        </a:xfrm>
+      </p:grpSpPr>
+      <p:sp>
+        <p:nvSpPr>
+          <p:cNvPr id="2" name="Espace réservé de l'image des diapositives 1"/>
+          <p:cNvSpPr>
+            <a:spLocks noGrp="1" noRot="1" noChangeAspect="1"/>
+          </p:cNvSpPr>
+          <p:nvPr>
+            <p:ph type="sldImg"/>
+          </p:nvPr>
+        </p:nvSpPr>
+        <p:spPr/>
+      </p:sp>
+      <p:sp>
+        <p:nvSpPr>
+          <p:cNvPr id="3" name="Espace réservé des commentaires 2"/>
+          <p:cNvSpPr>
+            <a:spLocks noGrp="1"/>
+          </p:cNvSpPr>
+          <p:nvPr>
+            <p:ph type="body" idx="1"/>
+          </p:nvPr>
+        </p:nvSpPr>
+        <p:spPr/>
+        <p:txBody>
+          <a:bodyPr/>
+          <a:lstStyle/>
+          <a:p>
+            <a:r>
+              <a:rPr lang="fr-FR" dirty="0" smtClean="0"/>
+              <a:t>Parler des livrables demandés</a:t>
+            </a:r>
+            <a:endParaRPr lang="fr-FR" dirty="0"/>
+          </a:p>
+        </p:txBody>
+      </p:sp>
+      <p:sp>
+        <p:nvSpPr>
+          <p:cNvPr id="4" name="Espace réservé du numéro de diapositive 3"/>
+          <p:cNvSpPr>
+            <a:spLocks noGrp="1"/>
+          </p:cNvSpPr>
+          <p:nvPr>
+            <p:ph type="sldNum" sz="quarter" idx="10"/>
+          </p:nvPr>
+        </p:nvSpPr>
+        <p:spPr/>
+        <p:txBody>
+          <a:bodyPr/>
+          <a:lstStyle/>
+          <a:p>
+            <a:pPr>
+              <a:defRPr/>
+            </a:pPr>
+            <a:fld id="{AEE71C3C-82B0-485C-B7F2-6F4187610521}" type="slidenum">
+              <a:rPr lang="fr-FR" smtClean="0"/>
+              <a:pPr>
+                <a:defRPr/>
+              </a:pPr>
+              <a:t>3</a:t>
+            </a:fld>
+            <a:endParaRPr lang="fr-FR"/>
+          </a:p>
+        </p:txBody>
+      </p:sp>
+    </p:spTree>
+    <p:extLst>
+      <p:ext uri="{BB962C8B-B14F-4D97-AF65-F5344CB8AC3E}">
+        <p14:creationId xmlns:p14="http://schemas.microsoft.com/office/powerpoint/2010/main" val="2573102592"/>
+      </p:ext>
+    </p:extLst>
+  </p:cSld>
+  <p:clrMapOvr>
+    <a:masterClrMapping/>
+  </p:clrMapOvr>
+</p:notes>
+</file>
+
+<file path=ppt/notesSlides/notesSlide2.xml><?xml version="1.0" encoding="utf-8"?>
+<p:notes xmlns:a="http://schemas.openxmlformats.org/drawingml/2006/main" xmlns:r="http://schemas.openxmlformats.org/officeDocument/2006/relationships" xmlns:p="http://schemas.openxmlformats.org/presentationml/2006/main">
+  <p:cSld>
+    <p:spTree>
+      <p:nvGrpSpPr>
+        <p:cNvPr id="1" name=""/>
+        <p:cNvGrpSpPr/>
+        <p:nvPr/>
+      </p:nvGrpSpPr>
+      <p:grpSpPr>
+        <a:xfrm>
+          <a:off x="0" y="0"/>
+          <a:ext cx="0" cy="0"/>
+          <a:chOff x="0" y="0"/>
+          <a:chExt cx="0" cy="0"/>
+        </a:xfrm>
+      </p:grpSpPr>
+      <p:sp>
+        <p:nvSpPr>
+          <p:cNvPr id="2" name="Espace réservé de l'image des diapositives 1"/>
+          <p:cNvSpPr>
+            <a:spLocks noGrp="1" noRot="1" noChangeAspect="1"/>
+          </p:cNvSpPr>
+          <p:nvPr>
+            <p:ph type="sldImg"/>
+          </p:nvPr>
+        </p:nvSpPr>
+        <p:spPr/>
+      </p:sp>
+      <p:sp>
+        <p:nvSpPr>
+          <p:cNvPr id="3" name="Espace réservé des commentaires 2"/>
+          <p:cNvSpPr>
+            <a:spLocks noGrp="1"/>
+          </p:cNvSpPr>
+          <p:nvPr>
+            <p:ph type="body" idx="1"/>
+          </p:nvPr>
+        </p:nvSpPr>
+        <p:spPr/>
+        <p:txBody>
+          <a:bodyPr/>
+          <a:lstStyle/>
+          <a:p>
+            <a:r>
+              <a:rPr lang="fr-FR" dirty="0" smtClean="0"/>
+              <a:t>Retard :</a:t>
+            </a:r>
+          </a:p>
+          <a:p>
+            <a:pPr marL="171450" indent="-171450">
+              <a:buFontTx/>
+              <a:buChar char="-"/>
+            </a:pPr>
+            <a:r>
+              <a:rPr lang="fr-FR" baseline="0" dirty="0" smtClean="0"/>
+              <a:t>Lecture fichier XML : arbre XML complexe + problème de manipulation du fichier XML </a:t>
+            </a:r>
+          </a:p>
+          <a:p>
+            <a:pPr marL="171450" indent="-171450">
+              <a:buFontTx/>
+              <a:buChar char="-"/>
+            </a:pPr>
+            <a:r>
+              <a:rPr lang="fr-FR" baseline="0" dirty="0" smtClean="0"/>
+              <a:t>Identification rapide : bug avec </a:t>
+            </a:r>
+            <a:r>
+              <a:rPr lang="fr-FR" baseline="0" dirty="0" err="1" smtClean="0"/>
+              <a:t>Android</a:t>
+            </a:r>
+            <a:r>
+              <a:rPr lang="fr-FR" baseline="0" dirty="0" smtClean="0"/>
+              <a:t> + mauvaise compréhension de ce qu’il fallait faire</a:t>
+            </a:r>
+          </a:p>
+          <a:p>
+            <a:pPr marL="171450" indent="-171450">
+              <a:buFontTx/>
+              <a:buChar char="-"/>
+            </a:pPr>
+            <a:endParaRPr lang="fr-FR" baseline="0" dirty="0" smtClean="0"/>
+          </a:p>
+          <a:p>
+            <a:pPr marL="0" indent="0">
+              <a:buFontTx/>
+              <a:buNone/>
+            </a:pPr>
+            <a:r>
+              <a:rPr lang="fr-FR" baseline="0" dirty="0" smtClean="0"/>
+              <a:t>Les nombreuses réunions avec le client nous ont permis de développer l’application en « collant » aux mieux à leurs attentes. </a:t>
+            </a:r>
+          </a:p>
+          <a:p>
+            <a:pPr marL="0" indent="0">
+              <a:buFontTx/>
+              <a:buNone/>
+            </a:pPr>
+            <a:r>
+              <a:rPr lang="fr-FR" baseline="0" dirty="0" smtClean="0"/>
+              <a:t>Au niveau de l’équipe, nous organisions des réunions régulières (semblant de méthodologie </a:t>
+            </a:r>
+            <a:r>
+              <a:rPr lang="fr-FR" baseline="0" dirty="0" err="1" smtClean="0"/>
+              <a:t>Scrum</a:t>
+            </a:r>
+            <a:r>
+              <a:rPr lang="fr-FR" baseline="0" dirty="0" smtClean="0"/>
+              <a:t>) </a:t>
+            </a:r>
+            <a:endParaRPr lang="fr-FR" dirty="0"/>
+          </a:p>
+        </p:txBody>
+      </p:sp>
+      <p:sp>
+        <p:nvSpPr>
+          <p:cNvPr id="4" name="Espace réservé du numéro de diapositive 3"/>
+          <p:cNvSpPr>
+            <a:spLocks noGrp="1"/>
+          </p:cNvSpPr>
+          <p:nvPr>
+            <p:ph type="sldNum" sz="quarter" idx="10"/>
+          </p:nvPr>
+        </p:nvSpPr>
+        <p:spPr/>
+        <p:txBody>
+          <a:bodyPr/>
+          <a:lstStyle/>
+          <a:p>
+            <a:pPr>
+              <a:defRPr/>
+            </a:pPr>
+            <a:fld id="{AEE71C3C-82B0-485C-B7F2-6F4187610521}" type="slidenum">
+              <a:rPr lang="fr-FR" smtClean="0"/>
+              <a:pPr>
+                <a:defRPr/>
+              </a:pPr>
+              <a:t>16</a:t>
+            </a:fld>
+            <a:endParaRPr lang="fr-FR"/>
+          </a:p>
+        </p:txBody>
+      </p:sp>
+    </p:spTree>
+    <p:extLst>
+      <p:ext uri="{BB962C8B-B14F-4D97-AF65-F5344CB8AC3E}">
+        <p14:creationId xmlns:p14="http://schemas.microsoft.com/office/powerpoint/2010/main" val="165685208"/>
+      </p:ext>
+    </p:extLst>
+  </p:cSld>
+  <p:clrMapOvr>
+    <a:masterClrMapping/>
+  </p:clrMapOvr>
+</p:notes>
+</file>
+
+<file path=ppt/notesSlides/notesSlide3.xml><?xml version="1.0" encoding="utf-8"?>
+<p:notes xmlns:a="http://schemas.openxmlformats.org/drawingml/2006/main" xmlns:r="http://schemas.openxmlformats.org/officeDocument/2006/relationships" xmlns:p="http://schemas.openxmlformats.org/presentationml/2006/main">
+  <p:cSld>
+    <p:spTree>
+      <p:nvGrpSpPr>
+        <p:cNvPr id="1" name=""/>
+        <p:cNvGrpSpPr/>
+        <p:nvPr/>
+      </p:nvGrpSpPr>
+      <p:grpSpPr>
+        <a:xfrm>
+          <a:off x="0" y="0"/>
+          <a:ext cx="0" cy="0"/>
+          <a:chOff x="0" y="0"/>
+          <a:chExt cx="0" cy="0"/>
+        </a:xfrm>
+      </p:grpSpPr>
+      <p:sp>
+        <p:nvSpPr>
+          <p:cNvPr id="2" name="Espace réservé de l'image des diapositives 1"/>
+          <p:cNvSpPr>
+            <a:spLocks noGrp="1" noRot="1" noChangeAspect="1"/>
+          </p:cNvSpPr>
+          <p:nvPr>
+            <p:ph type="sldImg"/>
+          </p:nvPr>
+        </p:nvSpPr>
+        <p:spPr/>
+      </p:sp>
+      <p:sp>
+        <p:nvSpPr>
+          <p:cNvPr id="3" name="Espace réservé des commentaires 2"/>
+          <p:cNvSpPr>
+            <a:spLocks noGrp="1"/>
+          </p:cNvSpPr>
+          <p:nvPr>
+            <p:ph type="body" idx="1"/>
+          </p:nvPr>
+        </p:nvSpPr>
+        <p:spPr/>
+        <p:txBody>
+          <a:bodyPr/>
+          <a:lstStyle/>
+          <a:p>
+            <a:endParaRPr lang="fr-FR" dirty="0"/>
+          </a:p>
+        </p:txBody>
+      </p:sp>
+      <p:sp>
+        <p:nvSpPr>
+          <p:cNvPr id="4" name="Espace réservé du numéro de diapositive 3"/>
+          <p:cNvSpPr>
+            <a:spLocks noGrp="1"/>
+          </p:cNvSpPr>
+          <p:nvPr>
+            <p:ph type="sldNum" sz="quarter" idx="10"/>
+          </p:nvPr>
+        </p:nvSpPr>
+        <p:spPr/>
+        <p:txBody>
+          <a:bodyPr/>
+          <a:lstStyle/>
+          <a:p>
+            <a:pPr>
+              <a:defRPr/>
+            </a:pPr>
+            <a:fld id="{AEE71C3C-82B0-485C-B7F2-6F4187610521}" type="slidenum">
+              <a:rPr lang="fr-FR" smtClean="0"/>
+              <a:pPr>
+                <a:defRPr/>
+              </a:pPr>
+              <a:t>17</a:t>
+            </a:fld>
+            <a:endParaRPr lang="fr-FR"/>
+          </a:p>
+        </p:txBody>
+      </p:sp>
+    </p:spTree>
+    <p:extLst>
+      <p:ext uri="{BB962C8B-B14F-4D97-AF65-F5344CB8AC3E}">
+        <p14:creationId xmlns:p14="http://schemas.microsoft.com/office/powerpoint/2010/main" val="1454519747"/>
+      </p:ext>
+    </p:extLst>
+  </p:cSld>
+  <p:clrMapOvr>
+    <a:masterClrMapping/>
+  </p:clrMapOvr>
+</p:notes>
+</file>
+
 <file path=ppt/slideLayouts/slideLayout1.xml><?xml version="1.0" encoding="utf-8"?>
 <p:sldLayout xmlns:a="http://schemas.openxmlformats.org/drawingml/2006/main" xmlns:r="http://schemas.openxmlformats.org/officeDocument/2006/relationships" xmlns:p="http://schemas.openxmlformats.org/presentationml/2006/main" preserve="1">
   <p:cSld name="Diapositive de titre">
@@ -656,7 +1006,7 @@
             <a:fld id="{9D21D778-B565-4D7E-94D7-64010A445B68}" type="datetimeFigureOut">
               <a:rPr lang="en-US" smtClean="0"/>
               <a:pPr/>
-              <a:t>6/4/2012</a:t>
+              <a:t>6/5/2012</a:t>
             </a:fld>
             <a:endParaRPr lang="en-US"/>
           </a:p>
@@ -903,7 +1253,7 @@
             <a:fld id="{31999475-DD53-E34B-AD25-38E09DF725A3}" type="datetimeFigureOut">
               <a:rPr lang="fr-FR" smtClean="0"/>
               <a:pPr/>
-              <a:t>04/06/2012</a:t>
+              <a:t>05/06/2012</a:t>
             </a:fld>
             <a:endParaRPr lang="fr-FR"/>
           </a:p>
@@ -1123,7 +1473,7 @@
             <a:fld id="{31999475-DD53-E34B-AD25-38E09DF725A3}" type="datetimeFigureOut">
               <a:rPr lang="fr-FR" smtClean="0"/>
               <a:pPr/>
-              <a:t>04/06/2012</a:t>
+              <a:t>05/06/2012</a:t>
             </a:fld>
             <a:endParaRPr lang="fr-FR"/>
           </a:p>
@@ -1425,7 +1775,7 @@
             <a:fld id="{9D21D778-B565-4D7E-94D7-64010A445B68}" type="datetimeFigureOut">
               <a:rPr lang="en-US" smtClean="0"/>
               <a:pPr/>
-              <a:t>6/4/2012</a:t>
+              <a:t>6/5/2012</a:t>
             </a:fld>
             <a:endParaRPr lang="en-US"/>
           </a:p>
@@ -1741,7 +2091,7 @@
             <a:fld id="{31999475-DD53-E34B-AD25-38E09DF725A3}" type="datetimeFigureOut">
               <a:rPr lang="fr-FR" smtClean="0"/>
               <a:pPr/>
-              <a:t>04/06/2012</a:t>
+              <a:t>05/06/2012</a:t>
             </a:fld>
             <a:endParaRPr lang="fr-FR"/>
           </a:p>
@@ -1905,7 +2255,7 @@
             <a:fld id="{31999475-DD53-E34B-AD25-38E09DF725A3}" type="datetimeFigureOut">
               <a:rPr lang="fr-FR" smtClean="0"/>
               <a:pPr/>
-              <a:t>04/06/2012</a:t>
+              <a:t>05/06/2012</a:t>
             </a:fld>
             <a:endParaRPr lang="fr-FR"/>
           </a:p>
@@ -2097,7 +2447,7 @@
             <a:fld id="{31999475-DD53-E34B-AD25-38E09DF725A3}" type="datetimeFigureOut">
               <a:rPr lang="fr-FR" smtClean="0"/>
               <a:pPr/>
-              <a:t>04/06/2012</a:t>
+              <a:t>05/06/2012</a:t>
             </a:fld>
             <a:endParaRPr lang="fr-FR"/>
           </a:p>
@@ -2654,7 +3004,7 @@
             <a:fld id="{31999475-DD53-E34B-AD25-38E09DF725A3}" type="datetimeFigureOut">
               <a:rPr lang="fr-FR" smtClean="0"/>
               <a:pPr/>
-              <a:t>04/06/2012</a:t>
+              <a:t>05/06/2012</a:t>
             </a:fld>
             <a:endParaRPr lang="fr-FR"/>
           </a:p>
@@ -3265,7 +3615,7 @@
 </p:sld>
 </file>
 
-<file path=ppt/slides/slide2.xml><?xml version="1.0" encoding="utf-8"?>
+<file path=ppt/slides/slide10.xml><?xml version="1.0" encoding="utf-8"?>
 <p:sld xmlns:a="http://schemas.openxmlformats.org/drawingml/2006/main" xmlns:r="http://schemas.openxmlformats.org/officeDocument/2006/relationships" xmlns:p="http://schemas.openxmlformats.org/presentationml/2006/main">
   <p:cSld>
     <p:spTree>
@@ -3284,7 +3634,7 @@
       </p:grpSpPr>
       <p:sp>
         <p:nvSpPr>
-          <p:cNvPr id="13" name="Titre 12"/>
+          <p:cNvPr id="2" name="Titre 1"/>
           <p:cNvSpPr>
             <a:spLocks noGrp="1"/>
           </p:cNvSpPr>
@@ -3299,7 +3649,7 @@
           <a:p>
             <a:r>
               <a:rPr lang="fr-FR" dirty="0" smtClean="0"/>
-              <a:t>Sommaire</a:t>
+              <a:t>III. Application PC (1)</a:t>
             </a:r>
             <a:endParaRPr lang="fr-FR" dirty="0"/>
           </a:p>
@@ -3307,7 +3657,7 @@
       </p:sp>
       <p:sp>
         <p:nvSpPr>
-          <p:cNvPr id="4" name="Espace réservé du contenu 3"/>
+          <p:cNvPr id="3" name="Espace réservé du contenu 2"/>
           <p:cNvSpPr>
             <a:spLocks noGrp="1"/>
           </p:cNvSpPr>
@@ -3317,148 +3667,499 @@
         </p:nvSpPr>
         <p:spPr>
           <a:xfrm>
-            <a:off x="251520" y="1428736"/>
-            <a:ext cx="8678198" cy="4572032"/>
+            <a:off x="755576" y="2132856"/>
+            <a:ext cx="7662864" cy="4984750"/>
           </a:xfrm>
         </p:spPr>
-        <p:txBody>
-          <a:bodyPr>
-            <a:noAutofit/>
-          </a:bodyPr>
-          <a:lstStyle/>
-          <a:p>
-            <a:r>
-              <a:rPr lang="fr-FR" sz="1800" dirty="0"/>
-              <a:t>Présentation du </a:t>
-            </a:r>
-            <a:r>
-              <a:rPr lang="fr-FR" sz="1800" dirty="0" smtClean="0"/>
-              <a:t>sujet</a:t>
-            </a:r>
-          </a:p>
-          <a:p>
-            <a:r>
-              <a:rPr lang="fr-FR" sz="1800" dirty="0" smtClean="0"/>
-              <a:t>Application </a:t>
-            </a:r>
-            <a:r>
-              <a:rPr lang="fr-FR" sz="1800" dirty="0"/>
-              <a:t>mobile</a:t>
-            </a:r>
-          </a:p>
-          <a:p>
-            <a:pPr lvl="2"/>
-            <a:r>
-              <a:rPr lang="fr-FR" sz="1800" dirty="0"/>
-              <a:t>Fonctionnement de l’application</a:t>
-            </a:r>
-          </a:p>
-          <a:p>
-            <a:pPr lvl="2"/>
-            <a:r>
-              <a:rPr lang="fr-FR" sz="1800" dirty="0"/>
-              <a:t>…</a:t>
-            </a:r>
-          </a:p>
-          <a:p>
-            <a:r>
-              <a:rPr lang="fr-FR" sz="1800" dirty="0"/>
-              <a:t>Application PC</a:t>
-            </a:r>
-          </a:p>
-          <a:p>
-            <a:pPr lvl="2"/>
-            <a:r>
-              <a:rPr lang="fr-FR" sz="1800" dirty="0"/>
-              <a:t>Structure de l’application</a:t>
-            </a:r>
-          </a:p>
-          <a:p>
-            <a:pPr lvl="2"/>
-            <a:r>
-              <a:rPr lang="fr-FR" sz="1800" dirty="0"/>
-              <a:t>Diagramme de classe</a:t>
-            </a:r>
-          </a:p>
-          <a:p>
-            <a:pPr lvl="2"/>
-            <a:r>
-              <a:rPr lang="fr-FR" sz="1800" dirty="0"/>
-              <a:t>…</a:t>
-            </a:r>
-          </a:p>
-          <a:p>
-            <a:r>
-              <a:rPr lang="fr-FR" sz="1800" dirty="0"/>
-              <a:t>Problèmes </a:t>
-            </a:r>
-            <a:r>
-              <a:rPr lang="fr-FR" sz="1800" dirty="0" smtClean="0"/>
-              <a:t>rencontrés</a:t>
-            </a:r>
-          </a:p>
-          <a:p>
-            <a:r>
-              <a:rPr lang="fr-FR" sz="1800" dirty="0" smtClean="0"/>
-              <a:t>Les évolutions</a:t>
-            </a:r>
-            <a:endParaRPr lang="fr-FR" sz="1800" dirty="0"/>
-          </a:p>
-          <a:p>
-            <a:r>
-              <a:rPr lang="fr-FR" sz="1800" dirty="0"/>
-              <a:t>Gestion du projet</a:t>
-            </a:r>
-          </a:p>
-          <a:p>
-            <a:r>
-              <a:rPr lang="fr-FR" sz="1800" dirty="0"/>
-              <a:t>Conclusion</a:t>
-            </a:r>
-          </a:p>
-          <a:p>
-            <a:pPr marL="320040" indent="-320040" eaLnBrk="1" fontAlgn="auto" hangingPunct="1">
-              <a:spcBef>
-                <a:spcPts val="1200"/>
-              </a:spcBef>
-              <a:spcAft>
-                <a:spcPts val="0"/>
-              </a:spcAft>
-              <a:tabLst>
-                <a:tab pos="625475" algn="l"/>
-              </a:tabLst>
-              <a:defRPr/>
-            </a:pPr>
-            <a:endParaRPr lang="fr-FR" sz="1800" dirty="0" smtClean="0"/>
-          </a:p>
-        </p:txBody>
-      </p:sp>
-      <p:sp>
-        <p:nvSpPr>
-          <p:cNvPr id="3" name="Espace réservé du numéro de diapositive 2"/>
-          <p:cNvSpPr>
-            <a:spLocks noGrp="1"/>
-          </p:cNvSpPr>
-          <p:nvPr>
-            <p:ph type="sldNum" sz="quarter" idx="12"/>
-          </p:nvPr>
-        </p:nvSpPr>
-        <p:spPr/>
         <p:txBody>
           <a:bodyPr>
             <a:normAutofit/>
           </a:bodyPr>
           <a:lstStyle/>
           <a:p>
+            <a:r>
+              <a:rPr lang="fr-FR" dirty="0" smtClean="0"/>
+              <a:t>Outil de création de l’arbre de classification et gestion des medias</a:t>
+            </a:r>
+          </a:p>
+          <a:p>
+            <a:pPr lvl="1"/>
+            <a:r>
+              <a:rPr lang="fr-FR" dirty="0" smtClean="0"/>
+              <a:t>Le fichier XML</a:t>
+            </a:r>
+            <a:endParaRPr lang="fr-FR" dirty="0" smtClean="0"/>
+          </a:p>
+          <a:p>
+            <a:pPr lvl="2"/>
+            <a:r>
+              <a:rPr lang="fr-FR" dirty="0" smtClean="0"/>
+              <a:t>Lien </a:t>
+            </a:r>
+            <a:r>
+              <a:rPr lang="fr-FR" dirty="0"/>
+              <a:t>entre notre application mobile et PC </a:t>
+            </a:r>
+            <a:endParaRPr lang="fr-FR" dirty="0" smtClean="0"/>
+          </a:p>
+        </p:txBody>
+      </p:sp>
+      <p:sp>
+        <p:nvSpPr>
+          <p:cNvPr id="4" name="Espace réservé du pied de page 3"/>
+          <p:cNvSpPr>
+            <a:spLocks noGrp="1"/>
+          </p:cNvSpPr>
+          <p:nvPr>
+            <p:ph type="ftr" sz="quarter" idx="11"/>
+          </p:nvPr>
+        </p:nvSpPr>
+        <p:spPr/>
+        <p:txBody>
+          <a:bodyPr/>
+          <a:lstStyle/>
+          <a:p>
             <a:pPr>
               <a:defRPr/>
             </a:pPr>
-            <a:fld id="{6EA4AD2F-DB8F-406F-9EDC-9C28080E3141}" type="slidenum">
+            <a:endParaRPr lang="fr-FR" dirty="0"/>
+          </a:p>
+        </p:txBody>
+      </p:sp>
+      <p:sp>
+        <p:nvSpPr>
+          <p:cNvPr id="5" name="Espace réservé du numéro de diapositive 4"/>
+          <p:cNvSpPr>
+            <a:spLocks noGrp="1"/>
+          </p:cNvSpPr>
+          <p:nvPr>
+            <p:ph type="sldNum" sz="quarter" idx="12"/>
+          </p:nvPr>
+        </p:nvSpPr>
+        <p:spPr/>
+        <p:txBody>
+          <a:bodyPr/>
+          <a:lstStyle/>
+          <a:p>
+            <a:pPr>
+              <a:defRPr/>
+            </a:pPr>
+            <a:fld id="{021B529B-D963-4490-8B63-853D4832476D}" type="slidenum">
+              <a:rPr lang="fr-FR" smtClean="0"/>
+              <a:pPr>
+                <a:defRPr/>
+              </a:pPr>
+              <a:t>10</a:t>
+            </a:fld>
+            <a:endParaRPr lang="fr-FR"/>
+          </a:p>
+        </p:txBody>
+      </p:sp>
+    </p:spTree>
+    <p:extLst>
+      <p:ext uri="{BB962C8B-B14F-4D97-AF65-F5344CB8AC3E}">
+        <p14:creationId xmlns:p14="http://schemas.microsoft.com/office/powerpoint/2010/main" val="3477337316"/>
+      </p:ext>
+    </p:extLst>
+  </p:cSld>
+  <p:clrMapOvr>
+    <a:masterClrMapping/>
+  </p:clrMapOvr>
+  <p:timing>
+    <p:tnLst>
+      <p:par>
+        <p:cTn id="1" dur="indefinite" restart="never" nodeType="tmRoot"/>
+      </p:par>
+    </p:tnLst>
+  </p:timing>
+</p:sld>
+</file>
+
+<file path=ppt/slides/slide11.xml><?xml version="1.0" encoding="utf-8"?>
+<p:sld xmlns:a="http://schemas.openxmlformats.org/drawingml/2006/main" xmlns:r="http://schemas.openxmlformats.org/officeDocument/2006/relationships" xmlns:p="http://schemas.openxmlformats.org/presentationml/2006/main">
+  <p:cSld>
+    <p:spTree>
+      <p:nvGrpSpPr>
+        <p:cNvPr id="1" name=""/>
+        <p:cNvGrpSpPr/>
+        <p:nvPr/>
+      </p:nvGrpSpPr>
+      <p:grpSpPr>
+        <a:xfrm>
+          <a:off x="0" y="0"/>
+          <a:ext cx="0" cy="0"/>
+          <a:chOff x="0" y="0"/>
+          <a:chExt cx="0" cy="0"/>
+        </a:xfrm>
+      </p:grpSpPr>
+      <p:sp>
+        <p:nvSpPr>
+          <p:cNvPr id="2" name="Titre 1"/>
+          <p:cNvSpPr>
+            <a:spLocks noGrp="1"/>
+          </p:cNvSpPr>
+          <p:nvPr>
+            <p:ph type="title"/>
+          </p:nvPr>
+        </p:nvSpPr>
+        <p:spPr/>
+        <p:txBody>
+          <a:bodyPr/>
+          <a:lstStyle/>
+          <a:p>
+            <a:r>
+              <a:rPr lang="fr-FR" dirty="0" smtClean="0"/>
+              <a:t>III. Application PC (2)</a:t>
+            </a:r>
+            <a:endParaRPr lang="fr-FR" dirty="0"/>
+          </a:p>
+        </p:txBody>
+      </p:sp>
+      <p:sp>
+        <p:nvSpPr>
+          <p:cNvPr id="4" name="Espace réservé du pied de page 3"/>
+          <p:cNvSpPr>
+            <a:spLocks noGrp="1"/>
+          </p:cNvSpPr>
+          <p:nvPr>
+            <p:ph type="ftr" sz="quarter" idx="11"/>
+          </p:nvPr>
+        </p:nvSpPr>
+        <p:spPr/>
+        <p:txBody>
+          <a:bodyPr/>
+          <a:lstStyle/>
+          <a:p>
+            <a:pPr>
+              <a:defRPr/>
+            </a:pPr>
+            <a:endParaRPr lang="fr-FR" dirty="0"/>
+          </a:p>
+        </p:txBody>
+      </p:sp>
+      <p:sp>
+        <p:nvSpPr>
+          <p:cNvPr id="5" name="Espace réservé du numéro de diapositive 4"/>
+          <p:cNvSpPr>
+            <a:spLocks noGrp="1"/>
+          </p:cNvSpPr>
+          <p:nvPr>
+            <p:ph type="sldNum" sz="quarter" idx="12"/>
+          </p:nvPr>
+        </p:nvSpPr>
+        <p:spPr/>
+        <p:txBody>
+          <a:bodyPr/>
+          <a:lstStyle/>
+          <a:p>
+            <a:pPr>
+              <a:defRPr/>
+            </a:pPr>
+            <a:fld id="{021B529B-D963-4490-8B63-853D4832476D}" type="slidenum">
+              <a:rPr lang="fr-FR" smtClean="0"/>
+              <a:pPr>
+                <a:defRPr/>
+              </a:pPr>
+              <a:t>11</a:t>
+            </a:fld>
+            <a:endParaRPr lang="fr-FR"/>
+          </a:p>
+        </p:txBody>
+      </p:sp>
+      <p:pic>
+        <p:nvPicPr>
+          <p:cNvPr id="7" name="Picture 2"/>
+          <p:cNvPicPr>
+            <a:picLocks noGrp="1" noChangeAspect="1" noChangeArrowheads="1"/>
+          </p:cNvPicPr>
+          <p:nvPr>
+            <p:ph idx="1"/>
+          </p:nvPr>
+        </p:nvPicPr>
+        <p:blipFill rotWithShape="1">
+          <a:blip r:embed="rId2">
+            <a:extLst>
+              <a:ext uri="{28A0092B-C50C-407E-A947-70E740481C1C}">
+                <a14:useLocalDpi xmlns:a14="http://schemas.microsoft.com/office/drawing/2010/main" val="0"/>
+              </a:ext>
+            </a:extLst>
+          </a:blip>
+          <a:srcRect r="45772"/>
+          <a:stretch/>
+        </p:blipFill>
+        <p:spPr bwMode="auto">
+          <a:xfrm>
+            <a:off x="179512" y="1628800"/>
+            <a:ext cx="8892480" cy="3823646"/>
+          </a:xfrm>
+          <a:prstGeom prst="rect">
+            <a:avLst/>
+          </a:prstGeom>
+          <a:noFill/>
+          <a:ln>
+            <a:noFill/>
+          </a:ln>
+          <a:effectLst/>
+          <a:extLst>
+            <a:ext uri="{909E8E84-426E-40DD-AFC4-6F175D3DCCD1}">
+              <a14:hiddenFill xmlns:a14="http://schemas.microsoft.com/office/drawing/2010/main">
+                <a:solidFill>
+                  <a:schemeClr val="accent1"/>
+                </a:solidFill>
+              </a14:hiddenFill>
+            </a:ext>
+            <a:ext uri="{91240B29-F687-4F45-9708-019B960494DF}">
+              <a14:hiddenLine xmlns:a14="http://schemas.microsoft.com/office/drawing/2010/main" w="9525">
+                <a:solidFill>
+                  <a:schemeClr val="tx1"/>
+                </a:solidFill>
+                <a:miter lim="800000"/>
+                <a:headEnd/>
+                <a:tailEnd/>
+              </a14:hiddenLine>
+            </a:ext>
+            <a:ext uri="{AF507438-7753-43E0-B8FC-AC1667EBCBE1}">
+              <a14:hiddenEffects xmlns:a14="http://schemas.microsoft.com/office/drawing/2010/main">
+                <a:effectLst>
+                  <a:outerShdw dist="35921" dir="2700000" algn="ctr" rotWithShape="0">
+                    <a:schemeClr val="bg2"/>
+                  </a:outerShdw>
+                </a:effectLst>
+              </a14:hiddenEffects>
+            </a:ext>
+          </a:extLst>
+        </p:spPr>
+      </p:pic>
+    </p:spTree>
+    <p:extLst>
+      <p:ext uri="{BB962C8B-B14F-4D97-AF65-F5344CB8AC3E}">
+        <p14:creationId xmlns:p14="http://schemas.microsoft.com/office/powerpoint/2010/main" val="898547941"/>
+      </p:ext>
+    </p:extLst>
+  </p:cSld>
+  <p:clrMapOvr>
+    <a:masterClrMapping/>
+  </p:clrMapOvr>
+  <p:timing>
+    <p:tnLst>
+      <p:par>
+        <p:cTn id="1" dur="indefinite" restart="never" nodeType="tmRoot"/>
+      </p:par>
+    </p:tnLst>
+  </p:timing>
+</p:sld>
+</file>
+
+<file path=ppt/slides/slide12.xml><?xml version="1.0" encoding="utf-8"?>
+<p:sld xmlns:a="http://schemas.openxmlformats.org/drawingml/2006/main" xmlns:r="http://schemas.openxmlformats.org/officeDocument/2006/relationships" xmlns:p="http://schemas.openxmlformats.org/presentationml/2006/main">
+  <p:cSld>
+    <p:bg>
+      <p:bgPr>
+        <a:solidFill>
+          <a:schemeClr val="bg1"/>
+        </a:solidFill>
+        <a:effectLst/>
+      </p:bgPr>
+    </p:bg>
+    <p:spTree>
+      <p:nvGrpSpPr>
+        <p:cNvPr id="1" name=""/>
+        <p:cNvGrpSpPr/>
+        <p:nvPr/>
+      </p:nvGrpSpPr>
+      <p:grpSpPr>
+        <a:xfrm>
+          <a:off x="0" y="0"/>
+          <a:ext cx="0" cy="0"/>
+          <a:chOff x="0" y="0"/>
+          <a:chExt cx="0" cy="0"/>
+        </a:xfrm>
+      </p:grpSpPr>
+      <p:sp>
+        <p:nvSpPr>
+          <p:cNvPr id="5" name="Espace réservé du numéro de diapositive 4"/>
+          <p:cNvSpPr>
+            <a:spLocks noGrp="1"/>
+          </p:cNvSpPr>
+          <p:nvPr>
+            <p:ph type="sldNum" sz="quarter" idx="12"/>
+          </p:nvPr>
+        </p:nvSpPr>
+        <p:spPr/>
+        <p:txBody>
+          <a:bodyPr/>
+          <a:lstStyle/>
+          <a:p>
+            <a:pPr>
+              <a:defRPr/>
+            </a:pPr>
+            <a:fld id="{021B529B-D963-4490-8B63-853D4832476D}" type="slidenum">
+              <a:rPr lang="fr-FR" smtClean="0"/>
+              <a:pPr>
+                <a:defRPr/>
+              </a:pPr>
+              <a:t>12</a:t>
+            </a:fld>
+            <a:endParaRPr lang="fr-FR"/>
+          </a:p>
+        </p:txBody>
+      </p:sp>
+      <p:pic>
+        <p:nvPicPr>
+          <p:cNvPr id="2050" name="Picture 2"/>
+          <p:cNvPicPr>
+            <a:picLocks noChangeAspect="1" noChangeArrowheads="1"/>
+          </p:cNvPicPr>
+          <p:nvPr/>
+        </p:nvPicPr>
+        <p:blipFill>
+          <a:blip r:embed="rId2">
+            <a:extLst>
+              <a:ext uri="{28A0092B-C50C-407E-A947-70E740481C1C}">
+                <a14:useLocalDpi xmlns:a14="http://schemas.microsoft.com/office/drawing/2010/main" val="0"/>
+              </a:ext>
+            </a:extLst>
+          </a:blip>
+          <a:srcRect/>
+          <a:stretch>
+            <a:fillRect/>
+          </a:stretch>
+        </p:blipFill>
+        <p:spPr bwMode="auto">
+          <a:xfrm>
+            <a:off x="971600" y="-1"/>
+            <a:ext cx="7128792" cy="6858001"/>
+          </a:xfrm>
+          <a:prstGeom prst="rect">
+            <a:avLst/>
+          </a:prstGeom>
+          <a:noFill/>
+          <a:ln>
+            <a:noFill/>
+          </a:ln>
+          <a:effectLst/>
+          <a:extLst>
+            <a:ext uri="{909E8E84-426E-40DD-AFC4-6F175D3DCCD1}">
+              <a14:hiddenFill xmlns:a14="http://schemas.microsoft.com/office/drawing/2010/main">
+                <a:solidFill>
+                  <a:schemeClr val="accent1"/>
+                </a:solidFill>
+              </a14:hiddenFill>
+            </a:ext>
+            <a:ext uri="{91240B29-F687-4F45-9708-019B960494DF}">
+              <a14:hiddenLine xmlns:a14="http://schemas.microsoft.com/office/drawing/2010/main" w="9525">
+                <a:solidFill>
+                  <a:schemeClr val="tx1"/>
+                </a:solidFill>
+                <a:miter lim="800000"/>
+                <a:headEnd/>
+                <a:tailEnd/>
+              </a14:hiddenLine>
+            </a:ext>
+            <a:ext uri="{AF507438-7753-43E0-B8FC-AC1667EBCBE1}">
+              <a14:hiddenEffects xmlns:a14="http://schemas.microsoft.com/office/drawing/2010/main">
+                <a:effectLst>
+                  <a:outerShdw dist="35921" dir="2700000" algn="ctr" rotWithShape="0">
+                    <a:schemeClr val="bg2"/>
+                  </a:outerShdw>
+                </a:effectLst>
+              </a14:hiddenEffects>
+            </a:ext>
+          </a:extLst>
+        </p:spPr>
+      </p:pic>
+    </p:spTree>
+    <p:extLst>
+      <p:ext uri="{BB962C8B-B14F-4D97-AF65-F5344CB8AC3E}">
+        <p14:creationId xmlns:p14="http://schemas.microsoft.com/office/powerpoint/2010/main" val="4244543892"/>
+      </p:ext>
+    </p:extLst>
+  </p:cSld>
+  <p:clrMapOvr>
+    <a:masterClrMapping/>
+  </p:clrMapOvr>
+  <p:timing>
+    <p:tnLst>
+      <p:par>
+        <p:cTn id="1" dur="indefinite" restart="never" nodeType="tmRoot"/>
+      </p:par>
+    </p:tnLst>
+  </p:timing>
+</p:sld>
+</file>
+
+<file path=ppt/slides/slide13.xml><?xml version="1.0" encoding="utf-8"?>
+<p:sld xmlns:a="http://schemas.openxmlformats.org/drawingml/2006/main" xmlns:r="http://schemas.openxmlformats.org/officeDocument/2006/relationships" xmlns:p="http://schemas.openxmlformats.org/presentationml/2006/main">
+  <p:cSld>
+    <p:spTree>
+      <p:nvGrpSpPr>
+        <p:cNvPr id="1" name=""/>
+        <p:cNvGrpSpPr/>
+        <p:nvPr/>
+      </p:nvGrpSpPr>
+      <p:grpSpPr>
+        <a:xfrm>
+          <a:off x="0" y="0"/>
+          <a:ext cx="0" cy="0"/>
+          <a:chOff x="0" y="0"/>
+          <a:chExt cx="0" cy="0"/>
+        </a:xfrm>
+      </p:grpSpPr>
+      <p:sp>
+        <p:nvSpPr>
+          <p:cNvPr id="15362" name="Titre 1"/>
+          <p:cNvSpPr>
+            <a:spLocks noGrp="1"/>
+          </p:cNvSpPr>
+          <p:nvPr>
+            <p:ph type="title"/>
+          </p:nvPr>
+        </p:nvSpPr>
+        <p:spPr>
+          <a:xfrm>
+            <a:off x="612775" y="142875"/>
+            <a:ext cx="8153400" cy="642938"/>
+          </a:xfrm>
+        </p:spPr>
+        <p:txBody>
+          <a:bodyPr/>
+          <a:lstStyle/>
+          <a:p>
+            <a:pPr eaLnBrk="1" hangingPunct="1"/>
+            <a:r>
+              <a:rPr lang="fr-FR" dirty="0" smtClean="0"/>
+              <a:t>III. Application PC (7)</a:t>
+            </a:r>
+            <a:endParaRPr lang="fr-FR" dirty="0" smtClean="0"/>
+          </a:p>
+        </p:txBody>
+      </p:sp>
+      <p:sp>
+        <p:nvSpPr>
+          <p:cNvPr id="3" name="Espace réservé du numéro de diapositive 2"/>
+          <p:cNvSpPr>
+            <a:spLocks noGrp="1"/>
+          </p:cNvSpPr>
+          <p:nvPr>
+            <p:ph type="sldNum" sz="quarter" idx="12"/>
+          </p:nvPr>
+        </p:nvSpPr>
+        <p:spPr/>
+        <p:txBody>
+          <a:bodyPr>
+            <a:normAutofit/>
+          </a:bodyPr>
+          <a:lstStyle/>
+          <a:p>
+            <a:pPr>
+              <a:defRPr/>
+            </a:pPr>
+            <a:fld id="{27D126A1-CB39-4EFE-8C38-F40292B1AFFB}" type="slidenum">
               <a:rPr lang="fr-FR"/>
               <a:pPr>
                 <a:defRPr/>
               </a:pPr>
-              <a:t>2</a:t>
+              <a:t>13</a:t>
             </a:fld>
             <a:endParaRPr lang="fr-FR"/>
           </a:p>
@@ -3466,65 +4167,41 @@
       </p:sp>
       <p:sp>
         <p:nvSpPr>
-          <p:cNvPr id="10" name="Rectangle 9"/>
-          <p:cNvSpPr/>
-          <p:nvPr/>
+          <p:cNvPr id="2" name="Espace réservé du contenu 1"/>
+          <p:cNvSpPr>
+            <a:spLocks noGrp="1"/>
+          </p:cNvSpPr>
+          <p:nvPr>
+            <p:ph idx="1"/>
+          </p:nvPr>
         </p:nvSpPr>
         <p:spPr>
           <a:xfrm>
-            <a:off x="1142976" y="6072206"/>
-            <a:ext cx="8001024" cy="785818"/>
+            <a:off x="179512" y="2996952"/>
+            <a:ext cx="8640959" cy="1440160"/>
           </a:xfrm>
-          <a:prstGeom prst="rect">
-            <a:avLst/>
-          </a:prstGeom>
-          <a:solidFill>
-            <a:srgbClr val="FF9900"/>
-          </a:solidFill>
-          <a:ln>
-            <a:noFill/>
-          </a:ln>
         </p:spPr>
-        <p:style>
-          <a:lnRef idx="3">
-            <a:schemeClr val="lt1"/>
-          </a:lnRef>
-          <a:fillRef idx="1">
-            <a:schemeClr val="accent1"/>
-          </a:fillRef>
-          <a:effectRef idx="1">
-            <a:schemeClr val="accent1"/>
-          </a:effectRef>
-          <a:fontRef idx="minor">
-            <a:schemeClr val="lt1"/>
-          </a:fontRef>
-        </p:style>
-        <p:txBody>
-          <a:bodyPr anchor="ctr"/>
-          <a:lstStyle/>
-          <a:p>
-            <a:pPr algn="r" fontAlgn="auto">
-              <a:spcBef>
-                <a:spcPts val="0"/>
-              </a:spcBef>
-              <a:spcAft>
-                <a:spcPts val="0"/>
-              </a:spcAft>
-              <a:defRPr/>
-            </a:pPr>
-            <a:r>
-              <a:rPr lang="fr-FR" sz="2800" b="1" dirty="0" smtClean="0">
-                <a:latin typeface="Calibri" pitchFamily="34" charset="0"/>
-              </a:rPr>
-              <a:t>Autre texte</a:t>
-            </a:r>
-            <a:endParaRPr lang="fr-FR" sz="2800" b="1" dirty="0">
-              <a:latin typeface="Calibri" pitchFamily="34" charset="0"/>
-            </a:endParaRPr>
+        <p:txBody>
+          <a:bodyPr>
+            <a:normAutofit/>
+          </a:bodyPr>
+          <a:lstStyle/>
+          <a:p>
+            <a:pPr algn="ctr"/>
+            <a:r>
+              <a:rPr lang="fr-FR" sz="5400" dirty="0" smtClean="0"/>
+              <a:t>Démonstration</a:t>
+            </a:r>
+            <a:endParaRPr lang="fr-FR" sz="5400" dirty="0"/>
           </a:p>
         </p:txBody>
       </p:sp>
     </p:spTree>
+    <p:extLst>
+      <p:ext uri="{BB962C8B-B14F-4D97-AF65-F5344CB8AC3E}">
+        <p14:creationId xmlns:p14="http://schemas.microsoft.com/office/powerpoint/2010/main" val="1564867628"/>
+      </p:ext>
+    </p:extLst>
   </p:cSld>
   <p:clrMapOvr>
     <a:masterClrMapping/>
@@ -3542,7 +4219,7 @@
 </p:sld>
 </file>
 
-<file path=ppt/slides/slide3.xml><?xml version="1.0" encoding="utf-8"?>
+<file path=ppt/slides/slide14.xml><?xml version="1.0" encoding="utf-8"?>
 <p:sld xmlns:a="http://schemas.openxmlformats.org/drawingml/2006/main" xmlns:r="http://schemas.openxmlformats.org/officeDocument/2006/relationships" xmlns:p="http://schemas.openxmlformats.org/presentationml/2006/main">
   <p:cSld>
     <p:spTree>
@@ -3576,28 +4253,13 @@
           <a:p>
             <a:r>
               <a:rPr lang="fr-FR" dirty="0" smtClean="0"/>
-              <a:t>Présentation du projet</a:t>
+              <a:t>IV. Les </a:t>
+            </a:r>
+            <a:r>
+              <a:rPr lang="fr-FR" dirty="0" smtClean="0"/>
+              <a:t>problèmes rencontrés</a:t>
             </a:r>
             <a:endParaRPr lang="fr-FR" dirty="0"/>
-          </a:p>
-        </p:txBody>
-      </p:sp>
-      <p:sp>
-        <p:nvSpPr>
-          <p:cNvPr id="3" name="Espace réservé du contenu 2"/>
-          <p:cNvSpPr>
-            <a:spLocks noGrp="1"/>
-          </p:cNvSpPr>
-          <p:nvPr>
-            <p:ph idx="1"/>
-          </p:nvPr>
-        </p:nvSpPr>
-        <p:spPr/>
-        <p:txBody>
-          <a:bodyPr/>
-          <a:lstStyle/>
-          <a:p>
-            <a:endParaRPr lang="fr-FR"/>
           </a:p>
         </p:txBody>
       </p:sp>
@@ -3624,190 +4286,7 @@
               <a:pPr>
                 <a:defRPr/>
               </a:pPr>
-              <a:t>3</a:t>
-            </a:fld>
-            <a:endParaRPr lang="fr-FR" dirty="0"/>
-          </a:p>
-        </p:txBody>
-      </p:sp>
-    </p:spTree>
-    <p:extLst>
-      <p:ext uri="{BB962C8B-B14F-4D97-AF65-F5344CB8AC3E}">
-        <p14:creationId xmlns:p14="http://schemas.microsoft.com/office/powerpoint/2010/main" val="2411707145"/>
-      </p:ext>
-    </p:extLst>
-  </p:cSld>
-  <p:clrMapOvr>
-    <a:masterClrMapping/>
-  </p:clrMapOvr>
-</p:sld>
-</file>
-
-<file path=ppt/slides/slide4.xml><?xml version="1.0" encoding="utf-8"?>
-<p:sld xmlns:a="http://schemas.openxmlformats.org/drawingml/2006/main" xmlns:r="http://schemas.openxmlformats.org/officeDocument/2006/relationships" xmlns:p="http://schemas.openxmlformats.org/presentationml/2006/main">
-  <p:cSld>
-    <p:spTree>
-      <p:nvGrpSpPr>
-        <p:cNvPr id="1" name=""/>
-        <p:cNvGrpSpPr/>
-        <p:nvPr/>
-      </p:nvGrpSpPr>
-      <p:grpSpPr>
-        <a:xfrm>
-          <a:off x="0" y="0"/>
-          <a:ext cx="0" cy="0"/>
-          <a:chOff x="0" y="0"/>
-          <a:chExt cx="0" cy="0"/>
-        </a:xfrm>
-      </p:grpSpPr>
-      <p:sp>
-        <p:nvSpPr>
-          <p:cNvPr id="2" name="Titre 1"/>
-          <p:cNvSpPr>
-            <a:spLocks noGrp="1"/>
-          </p:cNvSpPr>
-          <p:nvPr>
-            <p:ph type="title"/>
-          </p:nvPr>
-        </p:nvSpPr>
-        <p:spPr/>
-        <p:txBody>
-          <a:bodyPr/>
-          <a:lstStyle/>
-          <a:p>
-            <a:r>
-              <a:rPr lang="fr-FR" dirty="0" smtClean="0"/>
-              <a:t>Titre…</a:t>
-            </a:r>
-            <a:endParaRPr lang="fr-FR" dirty="0"/>
-          </a:p>
-        </p:txBody>
-      </p:sp>
-      <p:sp>
-        <p:nvSpPr>
-          <p:cNvPr id="3" name="Espace réservé du contenu 2"/>
-          <p:cNvSpPr>
-            <a:spLocks noGrp="1"/>
-          </p:cNvSpPr>
-          <p:nvPr>
-            <p:ph idx="1"/>
-          </p:nvPr>
-        </p:nvSpPr>
-        <p:spPr/>
-        <p:txBody>
-          <a:bodyPr/>
-          <a:lstStyle/>
-          <a:p>
-            <a:endParaRPr lang="fr-FR"/>
-          </a:p>
-        </p:txBody>
-      </p:sp>
-      <p:sp>
-        <p:nvSpPr>
-          <p:cNvPr id="4" name="Espace réservé du numéro de diapositive 3"/>
-          <p:cNvSpPr>
-            <a:spLocks noGrp="1"/>
-          </p:cNvSpPr>
-          <p:nvPr>
-            <p:ph type="sldNum" sz="quarter" idx="12"/>
-          </p:nvPr>
-        </p:nvSpPr>
-        <p:spPr/>
-        <p:txBody>
-          <a:bodyPr/>
-          <a:lstStyle/>
-          <a:p>
-            <a:pPr>
-              <a:defRPr/>
-            </a:pPr>
-            <a:fld id="{D1D235AC-8EA9-4E3D-A70A-049BD4DFED3A}" type="slidenum">
-              <a:rPr lang="fr-FR" smtClean="0"/>
-              <a:pPr>
-                <a:defRPr/>
-              </a:pPr>
-              <a:t>4</a:t>
-            </a:fld>
-            <a:endParaRPr lang="fr-FR" dirty="0"/>
-          </a:p>
-        </p:txBody>
-      </p:sp>
-    </p:spTree>
-    <p:extLst>
-      <p:ext uri="{BB962C8B-B14F-4D97-AF65-F5344CB8AC3E}">
-        <p14:creationId xmlns:p14="http://schemas.microsoft.com/office/powerpoint/2010/main" val="3878725414"/>
-      </p:ext>
-    </p:extLst>
-  </p:cSld>
-  <p:clrMapOvr>
-    <a:masterClrMapping/>
-  </p:clrMapOvr>
-</p:sld>
-</file>
-
-<file path=ppt/slides/slide5.xml><?xml version="1.0" encoding="utf-8"?>
-<p:sld xmlns:a="http://schemas.openxmlformats.org/drawingml/2006/main" xmlns:r="http://schemas.openxmlformats.org/officeDocument/2006/relationships" xmlns:p="http://schemas.openxmlformats.org/presentationml/2006/main">
-  <p:cSld>
-    <p:spTree>
-      <p:nvGrpSpPr>
-        <p:cNvPr id="1" name=""/>
-        <p:cNvGrpSpPr/>
-        <p:nvPr/>
-      </p:nvGrpSpPr>
-      <p:grpSpPr>
-        <a:xfrm>
-          <a:off x="0" y="0"/>
-          <a:ext cx="0" cy="0"/>
-          <a:chOff x="0" y="0"/>
-          <a:chExt cx="0" cy="0"/>
-        </a:xfrm>
-      </p:grpSpPr>
-      <p:sp>
-        <p:nvSpPr>
-          <p:cNvPr id="2" name="Titre 1"/>
-          <p:cNvSpPr>
-            <a:spLocks noGrp="1"/>
-          </p:cNvSpPr>
-          <p:nvPr>
-            <p:ph type="title"/>
-          </p:nvPr>
-        </p:nvSpPr>
-        <p:spPr/>
-        <p:txBody>
-          <a:bodyPr/>
-          <a:lstStyle/>
-          <a:p>
-            <a:r>
-              <a:rPr lang="fr-FR" dirty="0" smtClean="0"/>
-              <a:t>Les problèmes rencontrés</a:t>
-            </a:r>
-            <a:endParaRPr lang="fr-FR" dirty="0"/>
-          </a:p>
-        </p:txBody>
-      </p:sp>
-      <p:sp>
-        <p:nvSpPr>
-          <p:cNvPr id="4" name="Espace réservé du numéro de diapositive 3"/>
-          <p:cNvSpPr>
-            <a:spLocks noGrp="1"/>
-          </p:cNvSpPr>
-          <p:nvPr>
-            <p:ph type="sldNum" sz="quarter" idx="12"/>
-          </p:nvPr>
-        </p:nvSpPr>
-        <p:spPr/>
-        <p:txBody>
-          <a:bodyPr/>
-          <a:lstStyle/>
-          <a:p>
-            <a:pPr>
-              <a:defRPr/>
-            </a:pPr>
-            <a:fld id="{D1D235AC-8EA9-4E3D-A70A-049BD4DFED3A}" type="slidenum">
-              <a:rPr lang="fr-FR" smtClean="0"/>
-              <a:pPr>
-                <a:defRPr/>
-              </a:pPr>
-              <a:t>5</a:t>
+              <a:t>14</a:t>
             </a:fld>
             <a:endParaRPr lang="fr-FR" dirty="0"/>
           </a:p>
@@ -4382,7 +4861,7 @@
 </p:sld>
 </file>
 
-<file path=ppt/slides/slide6.xml><?xml version="1.0" encoding="utf-8"?>
+<file path=ppt/slides/slide15.xml><?xml version="1.0" encoding="utf-8"?>
 <p:sld xmlns:a="http://schemas.openxmlformats.org/drawingml/2006/main" xmlns:r="http://schemas.openxmlformats.org/officeDocument/2006/relationships" xmlns:p="http://schemas.openxmlformats.org/presentationml/2006/main">
   <p:cSld>
     <p:spTree>
@@ -4416,7 +4895,11 @@
           <a:p>
             <a:r>
               <a:rPr lang="fr-FR" dirty="0" smtClean="0"/>
-              <a:t>Les évolutions</a:t>
+              <a:t>V. Les </a:t>
+            </a:r>
+            <a:r>
+              <a:rPr lang="fr-FR" dirty="0" smtClean="0"/>
+              <a:t>évolutions</a:t>
             </a:r>
             <a:endParaRPr lang="fr-FR" dirty="0"/>
           </a:p>
@@ -4445,7 +4928,7 @@
               <a:pPr>
                 <a:defRPr/>
               </a:pPr>
-              <a:t>6</a:t>
+              <a:t>15</a:t>
             </a:fld>
             <a:endParaRPr lang="fr-FR" dirty="0"/>
           </a:p>
@@ -5012,6 +5495,1166 @@
 </p:sld>
 </file>
 
+<file path=ppt/slides/slide16.xml><?xml version="1.0" encoding="utf-8"?>
+<p:sld xmlns:a="http://schemas.openxmlformats.org/drawingml/2006/main" xmlns:r="http://schemas.openxmlformats.org/officeDocument/2006/relationships" xmlns:p="http://schemas.openxmlformats.org/presentationml/2006/main">
+  <p:cSld>
+    <p:spTree>
+      <p:nvGrpSpPr>
+        <p:cNvPr id="1" name=""/>
+        <p:cNvGrpSpPr/>
+        <p:nvPr/>
+      </p:nvGrpSpPr>
+      <p:grpSpPr>
+        <a:xfrm>
+          <a:off x="0" y="0"/>
+          <a:ext cx="0" cy="0"/>
+          <a:chOff x="0" y="0"/>
+          <a:chExt cx="0" cy="0"/>
+        </a:xfrm>
+      </p:grpSpPr>
+      <p:sp>
+        <p:nvSpPr>
+          <p:cNvPr id="2" name="Titre 1"/>
+          <p:cNvSpPr>
+            <a:spLocks noGrp="1"/>
+          </p:cNvSpPr>
+          <p:nvPr>
+            <p:ph type="title"/>
+          </p:nvPr>
+        </p:nvSpPr>
+        <p:spPr/>
+        <p:txBody>
+          <a:bodyPr/>
+          <a:lstStyle/>
+          <a:p>
+            <a:r>
+              <a:rPr lang="fr-FR" dirty="0" smtClean="0"/>
+              <a:t>VI. Aspect </a:t>
+            </a:r>
+            <a:r>
+              <a:rPr lang="fr-FR" dirty="0" smtClean="0"/>
+              <a:t>gestion de projet</a:t>
+            </a:r>
+            <a:endParaRPr lang="fr-FR" dirty="0"/>
+          </a:p>
+        </p:txBody>
+      </p:sp>
+      <p:sp>
+        <p:nvSpPr>
+          <p:cNvPr id="3" name="Espace réservé du contenu 2"/>
+          <p:cNvSpPr>
+            <a:spLocks noGrp="1"/>
+          </p:cNvSpPr>
+          <p:nvPr>
+            <p:ph idx="1"/>
+          </p:nvPr>
+        </p:nvSpPr>
+        <p:spPr/>
+        <p:txBody>
+          <a:bodyPr/>
+          <a:lstStyle/>
+          <a:p>
+            <a:r>
+              <a:rPr lang="fr-FR" dirty="0" smtClean="0"/>
+              <a:t>Découpage des tâches selon les préférences et les compétences de chacun</a:t>
+            </a:r>
+          </a:p>
+          <a:p>
+            <a:r>
+              <a:rPr lang="fr-FR" dirty="0" smtClean="0"/>
+              <a:t>Analyse des retards</a:t>
+            </a:r>
+          </a:p>
+          <a:p>
+            <a:pPr lvl="3"/>
+            <a:r>
+              <a:rPr lang="fr-FR" dirty="0" smtClean="0"/>
+              <a:t>Lecture du fichier XML</a:t>
+            </a:r>
+          </a:p>
+          <a:p>
+            <a:pPr lvl="3"/>
+            <a:r>
+              <a:rPr lang="fr-FR" dirty="0" smtClean="0"/>
+              <a:t>Identification rapide</a:t>
+            </a:r>
+            <a:endParaRPr lang="fr-FR" dirty="0"/>
+          </a:p>
+          <a:p>
+            <a:r>
+              <a:rPr lang="fr-FR" dirty="0" smtClean="0"/>
+              <a:t>Réunion et organisation</a:t>
+            </a:r>
+          </a:p>
+        </p:txBody>
+      </p:sp>
+      <p:sp>
+        <p:nvSpPr>
+          <p:cNvPr id="4" name="Espace réservé du numéro de diapositive 3"/>
+          <p:cNvSpPr>
+            <a:spLocks noGrp="1"/>
+          </p:cNvSpPr>
+          <p:nvPr>
+            <p:ph type="sldNum" sz="quarter" idx="12"/>
+          </p:nvPr>
+        </p:nvSpPr>
+        <p:spPr/>
+        <p:txBody>
+          <a:bodyPr/>
+          <a:lstStyle/>
+          <a:p>
+            <a:pPr>
+              <a:defRPr/>
+            </a:pPr>
+            <a:fld id="{D1D235AC-8EA9-4E3D-A70A-049BD4DFED3A}" type="slidenum">
+              <a:rPr lang="fr-FR" smtClean="0"/>
+              <a:pPr>
+                <a:defRPr/>
+              </a:pPr>
+              <a:t>16</a:t>
+            </a:fld>
+            <a:endParaRPr lang="fr-FR" dirty="0"/>
+          </a:p>
+        </p:txBody>
+      </p:sp>
+    </p:spTree>
+    <p:extLst>
+      <p:ext uri="{BB962C8B-B14F-4D97-AF65-F5344CB8AC3E}">
+        <p14:creationId xmlns:p14="http://schemas.microsoft.com/office/powerpoint/2010/main" val="678144098"/>
+      </p:ext>
+    </p:extLst>
+  </p:cSld>
+  <p:clrMapOvr>
+    <a:masterClrMapping/>
+  </p:clrMapOvr>
+</p:sld>
+</file>
+
+<file path=ppt/slides/slide17.xml><?xml version="1.0" encoding="utf-8"?>
+<p:sld xmlns:a="http://schemas.openxmlformats.org/drawingml/2006/main" xmlns:r="http://schemas.openxmlformats.org/officeDocument/2006/relationships" xmlns:p="http://schemas.openxmlformats.org/presentationml/2006/main">
+  <p:cSld>
+    <p:spTree>
+      <p:nvGrpSpPr>
+        <p:cNvPr id="1" name=""/>
+        <p:cNvGrpSpPr/>
+        <p:nvPr/>
+      </p:nvGrpSpPr>
+      <p:grpSpPr>
+        <a:xfrm>
+          <a:off x="0" y="0"/>
+          <a:ext cx="0" cy="0"/>
+          <a:chOff x="0" y="0"/>
+          <a:chExt cx="0" cy="0"/>
+        </a:xfrm>
+      </p:grpSpPr>
+      <p:sp>
+        <p:nvSpPr>
+          <p:cNvPr id="2" name="Titre 1"/>
+          <p:cNvSpPr>
+            <a:spLocks noGrp="1"/>
+          </p:cNvSpPr>
+          <p:nvPr>
+            <p:ph type="title"/>
+          </p:nvPr>
+        </p:nvSpPr>
+        <p:spPr/>
+        <p:txBody>
+          <a:bodyPr/>
+          <a:lstStyle/>
+          <a:p>
+            <a:r>
+              <a:rPr lang="fr-FR" dirty="0" smtClean="0"/>
+              <a:t>VII. Conclusion</a:t>
+            </a:r>
+            <a:endParaRPr lang="fr-FR" dirty="0"/>
+          </a:p>
+        </p:txBody>
+      </p:sp>
+      <p:sp>
+        <p:nvSpPr>
+          <p:cNvPr id="4" name="Espace réservé du numéro de diapositive 3"/>
+          <p:cNvSpPr>
+            <a:spLocks noGrp="1"/>
+          </p:cNvSpPr>
+          <p:nvPr>
+            <p:ph type="sldNum" sz="quarter" idx="12"/>
+          </p:nvPr>
+        </p:nvSpPr>
+        <p:spPr/>
+        <p:txBody>
+          <a:bodyPr/>
+          <a:lstStyle/>
+          <a:p>
+            <a:pPr>
+              <a:defRPr/>
+            </a:pPr>
+            <a:fld id="{D1D235AC-8EA9-4E3D-A70A-049BD4DFED3A}" type="slidenum">
+              <a:rPr lang="fr-FR" smtClean="0"/>
+              <a:pPr>
+                <a:defRPr/>
+              </a:pPr>
+              <a:t>17</a:t>
+            </a:fld>
+            <a:endParaRPr lang="fr-FR" dirty="0"/>
+          </a:p>
+        </p:txBody>
+      </p:sp>
+      <p:sp>
+        <p:nvSpPr>
+          <p:cNvPr id="6" name="Espace réservé du contenu 5"/>
+          <p:cNvSpPr>
+            <a:spLocks noGrp="1"/>
+          </p:cNvSpPr>
+          <p:nvPr>
+            <p:ph idx="1"/>
+          </p:nvPr>
+        </p:nvSpPr>
+        <p:spPr/>
+        <p:txBody>
+          <a:bodyPr/>
+          <a:lstStyle/>
+          <a:p>
+            <a:r>
+              <a:rPr lang="fr-FR" dirty="0" smtClean="0"/>
+              <a:t>Projet complet et concret</a:t>
+            </a:r>
+          </a:p>
+          <a:p>
+            <a:r>
+              <a:rPr lang="fr-FR" dirty="0" smtClean="0"/>
+              <a:t>Montée en compétence sur </a:t>
+            </a:r>
+            <a:r>
+              <a:rPr lang="fr-FR" dirty="0" err="1" smtClean="0"/>
+              <a:t>Qt</a:t>
+            </a:r>
+            <a:r>
+              <a:rPr lang="fr-FR" dirty="0" smtClean="0"/>
+              <a:t> (C++) et </a:t>
+            </a:r>
+            <a:r>
+              <a:rPr lang="fr-FR" dirty="0" err="1" smtClean="0"/>
+              <a:t>Android</a:t>
+            </a:r>
+            <a:r>
+              <a:rPr lang="fr-FR" dirty="0" smtClean="0"/>
+              <a:t> (Java)</a:t>
+            </a:r>
+          </a:p>
+          <a:p>
+            <a:r>
+              <a:rPr lang="fr-FR" dirty="0" smtClean="0"/>
+              <a:t>Première expérience de projet collectif  </a:t>
+            </a:r>
+          </a:p>
+          <a:p>
+            <a:endParaRPr lang="fr-FR" dirty="0"/>
+          </a:p>
+        </p:txBody>
+      </p:sp>
+    </p:spTree>
+    <p:extLst>
+      <p:ext uri="{BB962C8B-B14F-4D97-AF65-F5344CB8AC3E}">
+        <p14:creationId xmlns:p14="http://schemas.microsoft.com/office/powerpoint/2010/main" val="2475473505"/>
+      </p:ext>
+    </p:extLst>
+  </p:cSld>
+  <p:clrMapOvr>
+    <a:masterClrMapping/>
+  </p:clrMapOvr>
+</p:sld>
+</file>
+
+<file path=ppt/slides/slide2.xml><?xml version="1.0" encoding="utf-8"?>
+<p:sld xmlns:a="http://schemas.openxmlformats.org/drawingml/2006/main" xmlns:r="http://schemas.openxmlformats.org/officeDocument/2006/relationships" xmlns:p="http://schemas.openxmlformats.org/presentationml/2006/main">
+  <p:cSld>
+    <p:spTree>
+      <p:nvGrpSpPr>
+        <p:cNvPr id="1" name=""/>
+        <p:cNvGrpSpPr/>
+        <p:nvPr/>
+      </p:nvGrpSpPr>
+      <p:grpSpPr>
+        <a:xfrm>
+          <a:off x="0" y="0"/>
+          <a:ext cx="0" cy="0"/>
+          <a:chOff x="0" y="0"/>
+          <a:chExt cx="0" cy="0"/>
+        </a:xfrm>
+      </p:grpSpPr>
+      <p:sp>
+        <p:nvSpPr>
+          <p:cNvPr id="13" name="Titre 12"/>
+          <p:cNvSpPr>
+            <a:spLocks noGrp="1"/>
+          </p:cNvSpPr>
+          <p:nvPr>
+            <p:ph type="title"/>
+          </p:nvPr>
+        </p:nvSpPr>
+        <p:spPr/>
+        <p:txBody>
+          <a:bodyPr/>
+          <a:lstStyle/>
+          <a:p>
+            <a:r>
+              <a:rPr lang="fr-FR" dirty="0" smtClean="0"/>
+              <a:t>Sommaire</a:t>
+            </a:r>
+            <a:endParaRPr lang="fr-FR" dirty="0"/>
+          </a:p>
+        </p:txBody>
+      </p:sp>
+      <p:sp>
+        <p:nvSpPr>
+          <p:cNvPr id="4" name="Espace réservé du contenu 3"/>
+          <p:cNvSpPr>
+            <a:spLocks noGrp="1"/>
+          </p:cNvSpPr>
+          <p:nvPr>
+            <p:ph idx="1"/>
+          </p:nvPr>
+        </p:nvSpPr>
+        <p:spPr>
+          <a:xfrm>
+            <a:off x="395536" y="1428736"/>
+            <a:ext cx="8534182" cy="4572032"/>
+          </a:xfrm>
+        </p:spPr>
+        <p:txBody>
+          <a:bodyPr>
+            <a:noAutofit/>
+          </a:bodyPr>
+          <a:lstStyle/>
+          <a:p>
+            <a:r>
+              <a:rPr lang="fr-FR" sz="2800" dirty="0" smtClean="0"/>
+              <a:t>I. Présentation </a:t>
+            </a:r>
+            <a:r>
+              <a:rPr lang="fr-FR" sz="2800" dirty="0"/>
+              <a:t>du </a:t>
+            </a:r>
+            <a:r>
+              <a:rPr lang="fr-FR" sz="2800" dirty="0" smtClean="0"/>
+              <a:t>sujet</a:t>
+            </a:r>
+          </a:p>
+          <a:p>
+            <a:r>
+              <a:rPr lang="fr-FR" sz="2800" dirty="0" smtClean="0"/>
+              <a:t>II. Application </a:t>
+            </a:r>
+            <a:r>
+              <a:rPr lang="fr-FR" sz="2800" dirty="0"/>
+              <a:t>mobile</a:t>
+            </a:r>
+          </a:p>
+          <a:p>
+            <a:r>
+              <a:rPr lang="fr-FR" sz="2800" dirty="0" smtClean="0"/>
+              <a:t>III. Application </a:t>
+            </a:r>
+            <a:r>
+              <a:rPr lang="fr-FR" sz="2800" dirty="0"/>
+              <a:t>PC</a:t>
+            </a:r>
+          </a:p>
+          <a:p>
+            <a:r>
+              <a:rPr lang="fr-FR" sz="2800" dirty="0" smtClean="0"/>
+              <a:t>IV. Les problèmes </a:t>
+            </a:r>
+            <a:r>
+              <a:rPr lang="fr-FR" sz="2800" dirty="0" smtClean="0"/>
+              <a:t>rencontrés</a:t>
+            </a:r>
+          </a:p>
+          <a:p>
+            <a:r>
+              <a:rPr lang="fr-FR" sz="2800" dirty="0" smtClean="0"/>
+              <a:t>V. Les </a:t>
+            </a:r>
+            <a:r>
+              <a:rPr lang="fr-FR" sz="2800" dirty="0" smtClean="0"/>
+              <a:t>évolutions</a:t>
+            </a:r>
+            <a:endParaRPr lang="fr-FR" sz="2800" dirty="0"/>
+          </a:p>
+          <a:p>
+            <a:r>
+              <a:rPr lang="fr-FR" sz="2800" dirty="0" smtClean="0"/>
+              <a:t>VI. Aspect gestion </a:t>
+            </a:r>
+            <a:r>
+              <a:rPr lang="fr-FR" sz="2800" dirty="0"/>
+              <a:t>du projet</a:t>
+            </a:r>
+          </a:p>
+          <a:p>
+            <a:r>
+              <a:rPr lang="fr-FR" sz="2800" dirty="0" smtClean="0"/>
+              <a:t>VII. Conclusion</a:t>
+            </a:r>
+            <a:endParaRPr lang="fr-FR" sz="2800" dirty="0"/>
+          </a:p>
+          <a:p>
+            <a:pPr marL="320040" indent="-320040" eaLnBrk="1" fontAlgn="auto" hangingPunct="1">
+              <a:spcBef>
+                <a:spcPts val="1200"/>
+              </a:spcBef>
+              <a:spcAft>
+                <a:spcPts val="0"/>
+              </a:spcAft>
+              <a:tabLst>
+                <a:tab pos="625475" algn="l"/>
+              </a:tabLst>
+              <a:defRPr/>
+            </a:pPr>
+            <a:endParaRPr lang="fr-FR" sz="2800" dirty="0" smtClean="0"/>
+          </a:p>
+        </p:txBody>
+      </p:sp>
+      <p:sp>
+        <p:nvSpPr>
+          <p:cNvPr id="3" name="Espace réservé du numéro de diapositive 2"/>
+          <p:cNvSpPr>
+            <a:spLocks noGrp="1"/>
+          </p:cNvSpPr>
+          <p:nvPr>
+            <p:ph type="sldNum" sz="quarter" idx="12"/>
+          </p:nvPr>
+        </p:nvSpPr>
+        <p:spPr/>
+        <p:txBody>
+          <a:bodyPr>
+            <a:normAutofit/>
+          </a:bodyPr>
+          <a:lstStyle/>
+          <a:p>
+            <a:pPr>
+              <a:defRPr/>
+            </a:pPr>
+            <a:fld id="{6EA4AD2F-DB8F-406F-9EDC-9C28080E3141}" type="slidenum">
+              <a:rPr lang="fr-FR"/>
+              <a:pPr>
+                <a:defRPr/>
+              </a:pPr>
+              <a:t>2</a:t>
+            </a:fld>
+            <a:endParaRPr lang="fr-FR"/>
+          </a:p>
+        </p:txBody>
+      </p:sp>
+    </p:spTree>
+  </p:cSld>
+  <p:clrMapOvr>
+    <a:masterClrMapping/>
+  </p:clrMapOvr>
+  <p:transition advTm="10000">
+    <p:fade thruBlk="1"/>
+  </p:transition>
+  <p:timing>
+    <p:tnLst>
+      <p:par>
+        <p:cTn id="1" dur="indefinite" restart="never" nodeType="tmRoot"/>
+      </p:par>
+    </p:tnLst>
+  </p:timing>
+</p:sld>
+</file>
+
+<file path=ppt/slides/slide3.xml><?xml version="1.0" encoding="utf-8"?>
+<p:sld xmlns:a="http://schemas.openxmlformats.org/drawingml/2006/main" xmlns:r="http://schemas.openxmlformats.org/officeDocument/2006/relationships" xmlns:p="http://schemas.openxmlformats.org/presentationml/2006/main">
+  <p:cSld>
+    <p:spTree>
+      <p:nvGrpSpPr>
+        <p:cNvPr id="1" name=""/>
+        <p:cNvGrpSpPr/>
+        <p:nvPr/>
+      </p:nvGrpSpPr>
+      <p:grpSpPr>
+        <a:xfrm>
+          <a:off x="0" y="0"/>
+          <a:ext cx="0" cy="0"/>
+          <a:chOff x="0" y="0"/>
+          <a:chExt cx="0" cy="0"/>
+        </a:xfrm>
+      </p:grpSpPr>
+      <p:sp>
+        <p:nvSpPr>
+          <p:cNvPr id="2" name="Titre 1"/>
+          <p:cNvSpPr>
+            <a:spLocks noGrp="1"/>
+          </p:cNvSpPr>
+          <p:nvPr>
+            <p:ph type="title"/>
+          </p:nvPr>
+        </p:nvSpPr>
+        <p:spPr/>
+        <p:txBody>
+          <a:bodyPr/>
+          <a:lstStyle/>
+          <a:p>
+            <a:r>
+              <a:rPr lang="fr-FR" dirty="0" smtClean="0"/>
+              <a:t>I. Présentation </a:t>
+            </a:r>
+            <a:r>
+              <a:rPr lang="fr-FR" dirty="0" smtClean="0"/>
+              <a:t>du projet</a:t>
+            </a:r>
+            <a:endParaRPr lang="fr-FR" dirty="0"/>
+          </a:p>
+        </p:txBody>
+      </p:sp>
+      <p:sp>
+        <p:nvSpPr>
+          <p:cNvPr id="3" name="Espace réservé du contenu 2"/>
+          <p:cNvSpPr>
+            <a:spLocks noGrp="1"/>
+          </p:cNvSpPr>
+          <p:nvPr>
+            <p:ph idx="1"/>
+          </p:nvPr>
+        </p:nvSpPr>
+        <p:spPr/>
+        <p:txBody>
+          <a:bodyPr/>
+          <a:lstStyle/>
+          <a:p>
+            <a:r>
+              <a:rPr lang="fr-FR" dirty="0" smtClean="0"/>
+              <a:t>Projet à 8 sur 4 mois</a:t>
+            </a:r>
+          </a:p>
+          <a:p>
+            <a:r>
+              <a:rPr lang="fr-FR" dirty="0" smtClean="0"/>
+              <a:t>Une application mobile </a:t>
+            </a:r>
+          </a:p>
+          <a:p>
+            <a:pPr lvl="3"/>
+            <a:r>
+              <a:rPr lang="fr-FR" dirty="0" smtClean="0"/>
+              <a:t>Aide à la décision : quel est cet insecte ?</a:t>
+            </a:r>
+          </a:p>
+          <a:p>
+            <a:pPr lvl="3"/>
+            <a:r>
+              <a:rPr lang="fr-FR" dirty="0" smtClean="0"/>
+              <a:t>Permet de produire des statistiques</a:t>
+            </a:r>
+          </a:p>
+          <a:p>
+            <a:r>
+              <a:rPr lang="fr-FR" dirty="0" smtClean="0"/>
+              <a:t>Une application PC</a:t>
+            </a:r>
+          </a:p>
+          <a:p>
+            <a:pPr lvl="3"/>
+            <a:r>
+              <a:rPr lang="fr-FR" dirty="0" smtClean="0"/>
+              <a:t>Edition de l’arbre de décision</a:t>
+            </a:r>
+          </a:p>
+          <a:p>
+            <a:pPr lvl="3"/>
+            <a:r>
+              <a:rPr lang="fr-FR" dirty="0" smtClean="0"/>
+              <a:t>Destinée à un professionnel du domaine </a:t>
+            </a:r>
+          </a:p>
+          <a:p>
+            <a:pPr lvl="3"/>
+            <a:endParaRPr lang="fr-FR" dirty="0"/>
+          </a:p>
+        </p:txBody>
+      </p:sp>
+      <p:sp>
+        <p:nvSpPr>
+          <p:cNvPr id="4" name="Espace réservé du numéro de diapositive 3"/>
+          <p:cNvSpPr>
+            <a:spLocks noGrp="1"/>
+          </p:cNvSpPr>
+          <p:nvPr>
+            <p:ph type="sldNum" sz="quarter" idx="12"/>
+          </p:nvPr>
+        </p:nvSpPr>
+        <p:spPr/>
+        <p:txBody>
+          <a:bodyPr/>
+          <a:lstStyle/>
+          <a:p>
+            <a:pPr>
+              <a:defRPr/>
+            </a:pPr>
+            <a:fld id="{D1D235AC-8EA9-4E3D-A70A-049BD4DFED3A}" type="slidenum">
+              <a:rPr lang="fr-FR" smtClean="0"/>
+              <a:pPr>
+                <a:defRPr/>
+              </a:pPr>
+              <a:t>3</a:t>
+            </a:fld>
+            <a:endParaRPr lang="fr-FR" dirty="0"/>
+          </a:p>
+        </p:txBody>
+      </p:sp>
+    </p:spTree>
+    <p:extLst>
+      <p:ext uri="{BB962C8B-B14F-4D97-AF65-F5344CB8AC3E}">
+        <p14:creationId xmlns:p14="http://schemas.microsoft.com/office/powerpoint/2010/main" val="2411707145"/>
+      </p:ext>
+    </p:extLst>
+  </p:cSld>
+  <p:clrMapOvr>
+    <a:masterClrMapping/>
+  </p:clrMapOvr>
+</p:sld>
+</file>
+
+<file path=ppt/slides/slide4.xml><?xml version="1.0" encoding="utf-8"?>
+<p:sld xmlns:a="http://schemas.openxmlformats.org/drawingml/2006/main" xmlns:r="http://schemas.openxmlformats.org/officeDocument/2006/relationships" xmlns:p="http://schemas.openxmlformats.org/presentationml/2006/main">
+  <p:cSld>
+    <p:spTree>
+      <p:nvGrpSpPr>
+        <p:cNvPr id="1" name=""/>
+        <p:cNvGrpSpPr/>
+        <p:nvPr/>
+      </p:nvGrpSpPr>
+      <p:grpSpPr>
+        <a:xfrm>
+          <a:off x="0" y="0"/>
+          <a:ext cx="0" cy="0"/>
+          <a:chOff x="0" y="0"/>
+          <a:chExt cx="0" cy="0"/>
+        </a:xfrm>
+      </p:grpSpPr>
+      <p:sp>
+        <p:nvSpPr>
+          <p:cNvPr id="15362" name="Titre 1"/>
+          <p:cNvSpPr>
+            <a:spLocks noGrp="1"/>
+          </p:cNvSpPr>
+          <p:nvPr>
+            <p:ph type="title"/>
+          </p:nvPr>
+        </p:nvSpPr>
+        <p:spPr>
+          <a:xfrm>
+            <a:off x="612775" y="142875"/>
+            <a:ext cx="8153400" cy="642938"/>
+          </a:xfrm>
+        </p:spPr>
+        <p:txBody>
+          <a:bodyPr/>
+          <a:lstStyle/>
+          <a:p>
+            <a:pPr eaLnBrk="1" hangingPunct="1"/>
+            <a:r>
+              <a:rPr lang="fr-FR" dirty="0" smtClean="0"/>
+              <a:t>II. Application mobile (1)</a:t>
+            </a:r>
+            <a:endParaRPr lang="fr-FR" dirty="0" smtClean="0"/>
+          </a:p>
+        </p:txBody>
+      </p:sp>
+      <p:sp>
+        <p:nvSpPr>
+          <p:cNvPr id="3" name="Espace réservé du numéro de diapositive 2"/>
+          <p:cNvSpPr>
+            <a:spLocks noGrp="1"/>
+          </p:cNvSpPr>
+          <p:nvPr>
+            <p:ph type="sldNum" sz="quarter" idx="12"/>
+          </p:nvPr>
+        </p:nvSpPr>
+        <p:spPr/>
+        <p:txBody>
+          <a:bodyPr>
+            <a:normAutofit/>
+          </a:bodyPr>
+          <a:lstStyle/>
+          <a:p>
+            <a:pPr>
+              <a:defRPr/>
+            </a:pPr>
+            <a:fld id="{27D126A1-CB39-4EFE-8C38-F40292B1AFFB}" type="slidenum">
+              <a:rPr lang="fr-FR"/>
+              <a:pPr>
+                <a:defRPr/>
+              </a:pPr>
+              <a:t>4</a:t>
+            </a:fld>
+            <a:endParaRPr lang="fr-FR"/>
+          </a:p>
+        </p:txBody>
+      </p:sp>
+      <p:sp>
+        <p:nvSpPr>
+          <p:cNvPr id="2" name="Espace réservé du contenu 1"/>
+          <p:cNvSpPr>
+            <a:spLocks noGrp="1"/>
+          </p:cNvSpPr>
+          <p:nvPr>
+            <p:ph idx="1"/>
+          </p:nvPr>
+        </p:nvSpPr>
+        <p:spPr>
+          <a:xfrm>
+            <a:off x="739774" y="1772816"/>
+            <a:ext cx="8080697" cy="4583534"/>
+          </a:xfrm>
+        </p:spPr>
+        <p:txBody>
+          <a:bodyPr/>
+          <a:lstStyle/>
+          <a:p>
+            <a:r>
+              <a:rPr lang="fr-FR" dirty="0" smtClean="0"/>
+              <a:t>Objectifs </a:t>
+            </a:r>
+            <a:r>
+              <a:rPr lang="fr-FR" dirty="0" smtClean="0"/>
+              <a:t>:</a:t>
+            </a:r>
+          </a:p>
+          <a:p>
+            <a:pPr lvl="1"/>
+            <a:r>
+              <a:rPr lang="fr-FR" dirty="0" smtClean="0"/>
+              <a:t>Aider </a:t>
+            </a:r>
+            <a:r>
+              <a:rPr lang="fr-FR" dirty="0" smtClean="0"/>
+              <a:t>à l’identification d’insectes.</a:t>
+            </a:r>
+          </a:p>
+          <a:p>
+            <a:pPr lvl="2"/>
+            <a:r>
+              <a:rPr lang="fr-FR" dirty="0" smtClean="0"/>
+              <a:t>Questions et médias issues de l’application pc. </a:t>
+            </a:r>
+          </a:p>
+          <a:p>
+            <a:pPr lvl="2"/>
+            <a:r>
+              <a:rPr lang="fr-FR" dirty="0" smtClean="0"/>
+              <a:t>Insecte nuisible ou non</a:t>
+            </a:r>
+          </a:p>
+          <a:p>
+            <a:pPr lvl="1"/>
+            <a:r>
+              <a:rPr lang="fr-FR" dirty="0" smtClean="0"/>
+              <a:t>Aide au comptage d’insectes dans un piège</a:t>
+            </a:r>
+          </a:p>
+          <a:p>
+            <a:pPr lvl="2"/>
+            <a:r>
+              <a:rPr lang="fr-FR" dirty="0" smtClean="0"/>
+              <a:t>Rapport à </a:t>
+            </a:r>
+            <a:r>
+              <a:rPr lang="fr-FR" dirty="0" smtClean="0"/>
+              <a:t>INNOPHYT</a:t>
+            </a:r>
+            <a:endParaRPr lang="fr-FR" dirty="0"/>
+          </a:p>
+        </p:txBody>
+      </p:sp>
+    </p:spTree>
+    <p:extLst>
+      <p:ext uri="{BB962C8B-B14F-4D97-AF65-F5344CB8AC3E}">
+        <p14:creationId xmlns:p14="http://schemas.microsoft.com/office/powerpoint/2010/main" val="886551601"/>
+      </p:ext>
+    </p:extLst>
+  </p:cSld>
+  <p:clrMapOvr>
+    <a:masterClrMapping/>
+  </p:clrMapOvr>
+  <p:transition advTm="10000">
+    <p:fade thruBlk="1"/>
+  </p:transition>
+  <p:timing>
+    <p:tnLst>
+      <p:par>
+        <p:cTn id="1" dur="indefinite" restart="never" nodeType="tmRoot"/>
+      </p:par>
+    </p:tnLst>
+  </p:timing>
+</p:sld>
+</file>
+
+<file path=ppt/slides/slide5.xml><?xml version="1.0" encoding="utf-8"?>
+<p:sld xmlns:a="http://schemas.openxmlformats.org/drawingml/2006/main" xmlns:r="http://schemas.openxmlformats.org/officeDocument/2006/relationships" xmlns:p="http://schemas.openxmlformats.org/presentationml/2006/main">
+  <p:cSld>
+    <p:spTree>
+      <p:nvGrpSpPr>
+        <p:cNvPr id="1" name=""/>
+        <p:cNvGrpSpPr/>
+        <p:nvPr/>
+      </p:nvGrpSpPr>
+      <p:grpSpPr>
+        <a:xfrm>
+          <a:off x="0" y="0"/>
+          <a:ext cx="0" cy="0"/>
+          <a:chOff x="0" y="0"/>
+          <a:chExt cx="0" cy="0"/>
+        </a:xfrm>
+      </p:grpSpPr>
+      <p:sp>
+        <p:nvSpPr>
+          <p:cNvPr id="15362" name="Titre 1"/>
+          <p:cNvSpPr>
+            <a:spLocks noGrp="1"/>
+          </p:cNvSpPr>
+          <p:nvPr>
+            <p:ph type="title"/>
+          </p:nvPr>
+        </p:nvSpPr>
+        <p:spPr>
+          <a:xfrm>
+            <a:off x="612775" y="142875"/>
+            <a:ext cx="8153400" cy="642938"/>
+          </a:xfrm>
+        </p:spPr>
+        <p:txBody>
+          <a:bodyPr/>
+          <a:lstStyle/>
+          <a:p>
+            <a:pPr eaLnBrk="1" hangingPunct="1"/>
+            <a:r>
+              <a:rPr lang="fr-FR" dirty="0" smtClean="0"/>
+              <a:t>II. Application mobile (2)</a:t>
+            </a:r>
+            <a:endParaRPr lang="fr-FR" dirty="0" smtClean="0"/>
+          </a:p>
+        </p:txBody>
+      </p:sp>
+      <p:sp>
+        <p:nvSpPr>
+          <p:cNvPr id="3" name="Espace réservé du numéro de diapositive 2"/>
+          <p:cNvSpPr>
+            <a:spLocks noGrp="1"/>
+          </p:cNvSpPr>
+          <p:nvPr>
+            <p:ph type="sldNum" sz="quarter" idx="12"/>
+          </p:nvPr>
+        </p:nvSpPr>
+        <p:spPr/>
+        <p:txBody>
+          <a:bodyPr>
+            <a:normAutofit/>
+          </a:bodyPr>
+          <a:lstStyle/>
+          <a:p>
+            <a:pPr>
+              <a:defRPr/>
+            </a:pPr>
+            <a:fld id="{27D126A1-CB39-4EFE-8C38-F40292B1AFFB}" type="slidenum">
+              <a:rPr lang="fr-FR"/>
+              <a:pPr>
+                <a:defRPr/>
+              </a:pPr>
+              <a:t>5</a:t>
+            </a:fld>
+            <a:endParaRPr lang="fr-FR"/>
+          </a:p>
+        </p:txBody>
+      </p:sp>
+      <p:sp>
+        <p:nvSpPr>
+          <p:cNvPr id="2" name="Espace réservé du contenu 1"/>
+          <p:cNvSpPr>
+            <a:spLocks noGrp="1"/>
+          </p:cNvSpPr>
+          <p:nvPr>
+            <p:ph idx="1"/>
+          </p:nvPr>
+        </p:nvSpPr>
+        <p:spPr>
+          <a:xfrm>
+            <a:off x="739774" y="1628800"/>
+            <a:ext cx="8080697" cy="4727550"/>
+          </a:xfrm>
+        </p:spPr>
+        <p:txBody>
+          <a:bodyPr>
+            <a:normAutofit/>
+          </a:bodyPr>
+          <a:lstStyle/>
+          <a:p>
+            <a:r>
+              <a:rPr lang="fr-FR" dirty="0" smtClean="0"/>
+              <a:t>Démarche </a:t>
+            </a:r>
+            <a:r>
+              <a:rPr lang="fr-FR" dirty="0" smtClean="0"/>
+              <a:t>:</a:t>
+            </a:r>
+            <a:endParaRPr lang="fr-FR" dirty="0" smtClean="0"/>
+          </a:p>
+          <a:p>
+            <a:pPr lvl="1"/>
+            <a:r>
+              <a:rPr lang="fr-FR" dirty="0" smtClean="0"/>
+              <a:t>Le biologiste doit définir dans quel campagne s’inscrit sa recherche.</a:t>
+            </a:r>
+          </a:p>
+          <a:p>
+            <a:pPr lvl="1"/>
+            <a:r>
+              <a:rPr lang="fr-FR" dirty="0" smtClean="0"/>
+              <a:t>Chaque insecte dans un piège doit être identifié.</a:t>
+            </a:r>
+          </a:p>
+          <a:p>
+            <a:pPr lvl="1"/>
+            <a:r>
+              <a:rPr lang="fr-FR" dirty="0" smtClean="0"/>
+              <a:t>Une fois terminé, le rapport doit être envoyé à </a:t>
+            </a:r>
+            <a:r>
+              <a:rPr lang="fr-FR" dirty="0" smtClean="0"/>
+              <a:t>INNOPHYT</a:t>
+            </a:r>
+            <a:endParaRPr lang="fr-FR" dirty="0" smtClean="0"/>
+          </a:p>
+          <a:p>
+            <a:pPr marL="685800" lvl="2" indent="0">
+              <a:buNone/>
+            </a:pPr>
+            <a:r>
+              <a:rPr lang="fr-FR" dirty="0"/>
+              <a:t>	</a:t>
+            </a:r>
+            <a:r>
+              <a:rPr lang="fr-FR" dirty="0" smtClean="0"/>
+              <a:t>				</a:t>
+            </a:r>
+            <a:endParaRPr lang="fr-FR" dirty="0"/>
+          </a:p>
+        </p:txBody>
+      </p:sp>
+    </p:spTree>
+    <p:extLst>
+      <p:ext uri="{BB962C8B-B14F-4D97-AF65-F5344CB8AC3E}">
+        <p14:creationId xmlns:p14="http://schemas.microsoft.com/office/powerpoint/2010/main" val="646677635"/>
+      </p:ext>
+    </p:extLst>
+  </p:cSld>
+  <p:clrMapOvr>
+    <a:masterClrMapping/>
+  </p:clrMapOvr>
+  <p:transition advTm="10000">
+    <p:fade thruBlk="1"/>
+  </p:transition>
+  <p:timing>
+    <p:tnLst>
+      <p:par>
+        <p:cTn id="1" dur="indefinite" restart="never" nodeType="tmRoot"/>
+      </p:par>
+    </p:tnLst>
+  </p:timing>
+</p:sld>
+</file>
+
+<file path=ppt/slides/slide6.xml><?xml version="1.0" encoding="utf-8"?>
+<p:sld xmlns:a="http://schemas.openxmlformats.org/drawingml/2006/main" xmlns:r="http://schemas.openxmlformats.org/officeDocument/2006/relationships" xmlns:p="http://schemas.openxmlformats.org/presentationml/2006/main">
+  <p:cSld>
+    <p:spTree>
+      <p:nvGrpSpPr>
+        <p:cNvPr id="1" name=""/>
+        <p:cNvGrpSpPr/>
+        <p:nvPr/>
+      </p:nvGrpSpPr>
+      <p:grpSpPr>
+        <a:xfrm>
+          <a:off x="0" y="0"/>
+          <a:ext cx="0" cy="0"/>
+          <a:chOff x="0" y="0"/>
+          <a:chExt cx="0" cy="0"/>
+        </a:xfrm>
+      </p:grpSpPr>
+      <p:sp>
+        <p:nvSpPr>
+          <p:cNvPr id="15362" name="Titre 1"/>
+          <p:cNvSpPr>
+            <a:spLocks noGrp="1"/>
+          </p:cNvSpPr>
+          <p:nvPr>
+            <p:ph type="title"/>
+          </p:nvPr>
+        </p:nvSpPr>
+        <p:spPr>
+          <a:xfrm>
+            <a:off x="612775" y="142875"/>
+            <a:ext cx="8153400" cy="642938"/>
+          </a:xfrm>
+        </p:spPr>
+        <p:txBody>
+          <a:bodyPr/>
+          <a:lstStyle/>
+          <a:p>
+            <a:pPr eaLnBrk="1" hangingPunct="1"/>
+            <a:r>
+              <a:rPr lang="fr-FR" dirty="0" smtClean="0"/>
+              <a:t>II. Application mobile (3)</a:t>
+            </a:r>
+            <a:endParaRPr lang="fr-FR" dirty="0" smtClean="0"/>
+          </a:p>
+        </p:txBody>
+      </p:sp>
+      <p:sp>
+        <p:nvSpPr>
+          <p:cNvPr id="3" name="Espace réservé du numéro de diapositive 2"/>
+          <p:cNvSpPr>
+            <a:spLocks noGrp="1"/>
+          </p:cNvSpPr>
+          <p:nvPr>
+            <p:ph type="sldNum" sz="quarter" idx="12"/>
+          </p:nvPr>
+        </p:nvSpPr>
+        <p:spPr/>
+        <p:txBody>
+          <a:bodyPr>
+            <a:normAutofit/>
+          </a:bodyPr>
+          <a:lstStyle/>
+          <a:p>
+            <a:pPr>
+              <a:defRPr/>
+            </a:pPr>
+            <a:fld id="{27D126A1-CB39-4EFE-8C38-F40292B1AFFB}" type="slidenum">
+              <a:rPr lang="fr-FR"/>
+              <a:pPr>
+                <a:defRPr/>
+              </a:pPr>
+              <a:t>6</a:t>
+            </a:fld>
+            <a:endParaRPr lang="fr-FR"/>
+          </a:p>
+        </p:txBody>
+      </p:sp>
+      <p:sp>
+        <p:nvSpPr>
+          <p:cNvPr id="2" name="Espace réservé du contenu 1"/>
+          <p:cNvSpPr>
+            <a:spLocks noGrp="1"/>
+          </p:cNvSpPr>
+          <p:nvPr>
+            <p:ph idx="1"/>
+          </p:nvPr>
+        </p:nvSpPr>
+        <p:spPr>
+          <a:xfrm>
+            <a:off x="739774" y="1268760"/>
+            <a:ext cx="8080697" cy="5256584"/>
+          </a:xfrm>
+        </p:spPr>
+        <p:txBody>
+          <a:bodyPr>
+            <a:normAutofit/>
+          </a:bodyPr>
+          <a:lstStyle/>
+          <a:p>
+            <a:r>
+              <a:rPr lang="fr-FR" dirty="0" smtClean="0"/>
+              <a:t>Qu’est-ce qu’une campagne?</a:t>
+            </a:r>
+          </a:p>
+          <a:p>
+            <a:pPr lvl="1"/>
+            <a:r>
+              <a:rPr lang="fr-FR" dirty="0" smtClean="0"/>
+              <a:t>Structure un projet dans le temps</a:t>
+            </a:r>
+          </a:p>
+          <a:p>
+            <a:pPr lvl="2"/>
+            <a:r>
+              <a:rPr lang="fr-FR" dirty="0" smtClean="0"/>
+              <a:t>Date de début et de fin</a:t>
+            </a:r>
+          </a:p>
+          <a:p>
+            <a:pPr lvl="1"/>
+            <a:r>
+              <a:rPr lang="fr-FR" dirty="0" smtClean="0"/>
+              <a:t>Est subdivisée en parcelles</a:t>
+            </a:r>
+          </a:p>
+          <a:p>
+            <a:pPr lvl="2"/>
+            <a:r>
+              <a:rPr lang="fr-FR" dirty="0" smtClean="0"/>
+              <a:t>Structure le projet dans l’espace</a:t>
+            </a:r>
+          </a:p>
+          <a:p>
+            <a:pPr lvl="3"/>
+            <a:r>
+              <a:rPr lang="fr-FR" dirty="0" smtClean="0"/>
+              <a:t>Adresse et localisation GPS</a:t>
+            </a:r>
+          </a:p>
+          <a:p>
+            <a:pPr lvl="2"/>
+            <a:r>
+              <a:rPr lang="fr-FR" dirty="0" smtClean="0"/>
+              <a:t>Est subdivisée par des pièges</a:t>
+            </a:r>
+          </a:p>
+          <a:p>
+            <a:pPr lvl="3"/>
+            <a:r>
+              <a:rPr lang="fr-FR" dirty="0" smtClean="0"/>
+              <a:t>Piège réel qui capture des insectes.</a:t>
+            </a:r>
+          </a:p>
+          <a:p>
+            <a:pPr lvl="4"/>
+            <a:r>
+              <a:rPr lang="fr-FR" dirty="0"/>
+              <a:t>Insectes </a:t>
+            </a:r>
+            <a:r>
+              <a:rPr lang="fr-FR" dirty="0" smtClean="0"/>
+              <a:t>identifiés et comptabilisés.			</a:t>
+            </a:r>
+            <a:endParaRPr lang="fr-FR" dirty="0"/>
+          </a:p>
+        </p:txBody>
+      </p:sp>
+    </p:spTree>
+    <p:extLst>
+      <p:ext uri="{BB962C8B-B14F-4D97-AF65-F5344CB8AC3E}">
+        <p14:creationId xmlns:p14="http://schemas.microsoft.com/office/powerpoint/2010/main" val="3156846253"/>
+      </p:ext>
+    </p:extLst>
+  </p:cSld>
+  <p:clrMapOvr>
+    <a:masterClrMapping/>
+  </p:clrMapOvr>
+  <p:transition advTm="10000">
+    <p:fade thruBlk="1"/>
+  </p:transition>
+  <p:timing>
+    <p:tnLst>
+      <p:par>
+        <p:cTn id="1" dur="indefinite" restart="never" nodeType="tmRoot"/>
+      </p:par>
+    </p:tnLst>
+  </p:timing>
+</p:sld>
+</file>
+
 <file path=ppt/slides/slide7.xml><?xml version="1.0" encoding="utf-8"?>
 <p:sld xmlns:a="http://schemas.openxmlformats.org/drawingml/2006/main" xmlns:r="http://schemas.openxmlformats.org/officeDocument/2006/relationships" xmlns:p="http://schemas.openxmlformats.org/presentationml/2006/main">
   <p:cSld>
@@ -5031,7 +6674,7 @@
       </p:grpSpPr>
       <p:sp>
         <p:nvSpPr>
-          <p:cNvPr id="2" name="Titre 1"/>
+          <p:cNvPr id="15362" name="Titre 1"/>
           <p:cNvSpPr>
             <a:spLocks noGrp="1"/>
           </p:cNvSpPr>
@@ -5039,79 +6682,115 @@
             <p:ph type="title"/>
           </p:nvPr>
         </p:nvSpPr>
+        <p:spPr>
+          <a:xfrm>
+            <a:off x="612775" y="142875"/>
+            <a:ext cx="8153400" cy="642938"/>
+          </a:xfrm>
+        </p:spPr>
+        <p:txBody>
+          <a:bodyPr/>
+          <a:lstStyle/>
+          <a:p>
+            <a:pPr eaLnBrk="1" hangingPunct="1"/>
+            <a:r>
+              <a:rPr lang="fr-FR" dirty="0" smtClean="0"/>
+              <a:t>II. Application mobile (4)</a:t>
+            </a:r>
+            <a:endParaRPr lang="fr-FR" dirty="0" smtClean="0"/>
+          </a:p>
+        </p:txBody>
+      </p:sp>
+      <p:sp>
+        <p:nvSpPr>
+          <p:cNvPr id="3" name="Espace réservé du numéro de diapositive 2"/>
+          <p:cNvSpPr>
+            <a:spLocks noGrp="1"/>
+          </p:cNvSpPr>
+          <p:nvPr>
+            <p:ph type="sldNum" sz="quarter" idx="12"/>
+          </p:nvPr>
+        </p:nvSpPr>
         <p:spPr/>
         <p:txBody>
-          <a:bodyPr/>
-          <a:lstStyle/>
-          <a:p>
-            <a:r>
-              <a:rPr lang="fr-FR" dirty="0" smtClean="0"/>
-              <a:t>Aspect gestion de projet</a:t>
-            </a:r>
-            <a:endParaRPr lang="fr-FR" dirty="0"/>
-          </a:p>
-        </p:txBody>
-      </p:sp>
-      <p:sp>
-        <p:nvSpPr>
-          <p:cNvPr id="3" name="Espace réservé du contenu 2"/>
-          <p:cNvSpPr>
-            <a:spLocks noGrp="1"/>
-          </p:cNvSpPr>
-          <p:nvPr>
-            <p:ph idx="1"/>
-          </p:nvPr>
-        </p:nvSpPr>
-        <p:spPr/>
-        <p:txBody>
-          <a:bodyPr/>
-          <a:lstStyle/>
-          <a:p>
-            <a:r>
-              <a:rPr lang="fr-FR" dirty="0" smtClean="0"/>
-              <a:t>Parler du calendriers réel et du calendrier prévisionnel</a:t>
-            </a:r>
-          </a:p>
-          <a:p>
-            <a:r>
-              <a:rPr lang="fr-FR" dirty="0" smtClean="0"/>
-              <a:t>Expliquer comment on été répartis les tâches dans l’équipe</a:t>
-            </a:r>
-          </a:p>
-          <a:p>
-            <a:r>
-              <a:rPr lang="fr-FR" dirty="0" smtClean="0"/>
-              <a:t>Parler du fonctionnement du groupe : réunion de travail, bilan, assiduité…</a:t>
-            </a:r>
-            <a:endParaRPr lang="fr-FR" dirty="0"/>
-          </a:p>
-        </p:txBody>
-      </p:sp>
-      <p:sp>
-        <p:nvSpPr>
-          <p:cNvPr id="4" name="Espace réservé du numéro de diapositive 3"/>
-          <p:cNvSpPr>
-            <a:spLocks noGrp="1"/>
-          </p:cNvSpPr>
-          <p:nvPr>
-            <p:ph type="sldNum" sz="quarter" idx="12"/>
-          </p:nvPr>
-        </p:nvSpPr>
-        <p:spPr/>
-        <p:txBody>
-          <a:bodyPr/>
+          <a:bodyPr>
+            <a:normAutofit/>
+          </a:bodyPr>
           <a:lstStyle/>
           <a:p>
             <a:pPr>
               <a:defRPr/>
             </a:pPr>
-            <a:fld id="{D1D235AC-8EA9-4E3D-A70A-049BD4DFED3A}" type="slidenum">
-              <a:rPr lang="fr-FR" smtClean="0"/>
+            <a:fld id="{27D126A1-CB39-4EFE-8C38-F40292B1AFFB}" type="slidenum">
+              <a:rPr lang="fr-FR"/>
               <a:pPr>
                 <a:defRPr/>
               </a:pPr>
               <a:t>7</a:t>
             </a:fld>
+            <a:endParaRPr lang="fr-FR"/>
+          </a:p>
+        </p:txBody>
+      </p:sp>
+      <p:sp>
+        <p:nvSpPr>
+          <p:cNvPr id="2" name="Espace réservé du contenu 1"/>
+          <p:cNvSpPr>
+            <a:spLocks noGrp="1"/>
+          </p:cNvSpPr>
+          <p:nvPr>
+            <p:ph idx="1"/>
+          </p:nvPr>
+        </p:nvSpPr>
+        <p:spPr>
+          <a:xfrm>
+            <a:off x="739774" y="1628800"/>
+            <a:ext cx="8080697" cy="4896544"/>
+          </a:xfrm>
+        </p:spPr>
+        <p:txBody>
+          <a:bodyPr>
+            <a:normAutofit/>
+          </a:bodyPr>
+          <a:lstStyle/>
+          <a:p>
+            <a:r>
+              <a:rPr lang="fr-FR" dirty="0" smtClean="0"/>
+              <a:t>Comment identifier </a:t>
+            </a:r>
+            <a:r>
+              <a:rPr lang="fr-FR" dirty="0" smtClean="0"/>
+              <a:t>?</a:t>
+            </a:r>
+            <a:endParaRPr lang="fr-FR" dirty="0" smtClean="0"/>
+          </a:p>
+          <a:p>
+            <a:pPr lvl="1"/>
+            <a:r>
+              <a:rPr lang="fr-FR" dirty="0" smtClean="0"/>
+              <a:t>La recherche « normale »</a:t>
+            </a:r>
+          </a:p>
+          <a:p>
+            <a:pPr lvl="2"/>
+            <a:r>
+              <a:rPr lang="fr-FR" dirty="0" smtClean="0"/>
+              <a:t>Répondre à des questions agrémentées d’images pour aider à la prise de décision.</a:t>
+            </a:r>
+          </a:p>
+          <a:p>
+            <a:pPr lvl="1"/>
+            <a:r>
+              <a:rPr lang="fr-FR" dirty="0" smtClean="0"/>
+              <a:t>La recherche « rapide »</a:t>
+            </a:r>
+          </a:p>
+          <a:p>
+            <a:pPr lvl="2"/>
+            <a:r>
+              <a:rPr lang="fr-FR" dirty="0" smtClean="0"/>
+              <a:t>Sélection de l’insecte dans une galerie d’images.</a:t>
+            </a:r>
             <a:endParaRPr lang="fr-FR" dirty="0"/>
           </a:p>
         </p:txBody>
@@ -5119,13 +6798,23 @@
     </p:spTree>
     <p:extLst>
       <p:ext uri="{BB962C8B-B14F-4D97-AF65-F5344CB8AC3E}">
-        <p14:creationId xmlns:p14="http://schemas.microsoft.com/office/powerpoint/2010/main" val="678144098"/>
+        <p14:creationId xmlns:p14="http://schemas.microsoft.com/office/powerpoint/2010/main" val="2906240175"/>
       </p:ext>
     </p:extLst>
   </p:cSld>
   <p:clrMapOvr>
     <a:masterClrMapping/>
   </p:clrMapOvr>
+  <p:transition advTm="10000">
+    <p:fade thruBlk="1"/>
+  </p:transition>
+  <p:timing>
+    <p:tnLst>
+      <p:par>
+        <p:cTn id="1" dur="indefinite" restart="never" nodeType="tmRoot"/>
+      </p:par>
+    </p:tnLst>
+  </p:timing>
 </p:sld>
 </file>
 
@@ -5148,7 +6837,7 @@
       </p:grpSpPr>
       <p:sp>
         <p:nvSpPr>
-          <p:cNvPr id="2" name="Titre 1"/>
+          <p:cNvPr id="15362" name="Titre 1"/>
           <p:cNvSpPr>
             <a:spLocks noGrp="1"/>
           </p:cNvSpPr>
@@ -5156,63 +6845,94 @@
             <p:ph type="title"/>
           </p:nvPr>
         </p:nvSpPr>
+        <p:spPr>
+          <a:xfrm>
+            <a:off x="612775" y="142875"/>
+            <a:ext cx="8153400" cy="642938"/>
+          </a:xfrm>
+        </p:spPr>
+        <p:txBody>
+          <a:bodyPr/>
+          <a:lstStyle/>
+          <a:p>
+            <a:pPr eaLnBrk="1" hangingPunct="1"/>
+            <a:r>
+              <a:rPr lang="fr-FR" dirty="0" smtClean="0"/>
+              <a:t>II. Application mobile (5)</a:t>
+            </a:r>
+            <a:endParaRPr lang="fr-FR" dirty="0" smtClean="0"/>
+          </a:p>
+        </p:txBody>
+      </p:sp>
+      <p:sp>
+        <p:nvSpPr>
+          <p:cNvPr id="3" name="Espace réservé du numéro de diapositive 2"/>
+          <p:cNvSpPr>
+            <a:spLocks noGrp="1"/>
+          </p:cNvSpPr>
+          <p:nvPr>
+            <p:ph type="sldNum" sz="quarter" idx="12"/>
+          </p:nvPr>
+        </p:nvSpPr>
         <p:spPr/>
         <p:txBody>
-          <a:bodyPr/>
-          <a:lstStyle/>
-          <a:p>
-            <a:r>
-              <a:rPr lang="fr-FR" dirty="0" smtClean="0"/>
-              <a:t>Conclusion</a:t>
-            </a:r>
-            <a:endParaRPr lang="fr-FR" dirty="0"/>
-          </a:p>
-        </p:txBody>
-      </p:sp>
-      <p:sp>
-        <p:nvSpPr>
-          <p:cNvPr id="3" name="Espace réservé du contenu 2"/>
-          <p:cNvSpPr>
-            <a:spLocks noGrp="1"/>
-          </p:cNvSpPr>
-          <p:nvPr>
-            <p:ph idx="1"/>
-          </p:nvPr>
-        </p:nvSpPr>
-        <p:spPr/>
-        <p:txBody>
-          <a:bodyPr/>
-          <a:lstStyle/>
-          <a:p>
-            <a:endParaRPr lang="fr-FR"/>
-          </a:p>
-        </p:txBody>
-      </p:sp>
-      <p:sp>
-        <p:nvSpPr>
-          <p:cNvPr id="4" name="Espace réservé du numéro de diapositive 3"/>
-          <p:cNvSpPr>
-            <a:spLocks noGrp="1"/>
-          </p:cNvSpPr>
-          <p:nvPr>
-            <p:ph type="sldNum" sz="quarter" idx="12"/>
-          </p:nvPr>
-        </p:nvSpPr>
-        <p:spPr/>
-        <p:txBody>
-          <a:bodyPr/>
+          <a:bodyPr>
+            <a:normAutofit/>
+          </a:bodyPr>
           <a:lstStyle/>
           <a:p>
             <a:pPr>
               <a:defRPr/>
             </a:pPr>
-            <a:fld id="{D1D235AC-8EA9-4E3D-A70A-049BD4DFED3A}" type="slidenum">
-              <a:rPr lang="fr-FR" smtClean="0"/>
+            <a:fld id="{27D126A1-CB39-4EFE-8C38-F40292B1AFFB}" type="slidenum">
+              <a:rPr lang="fr-FR"/>
               <a:pPr>
                 <a:defRPr/>
               </a:pPr>
               <a:t>8</a:t>
             </a:fld>
+            <a:endParaRPr lang="fr-FR"/>
+          </a:p>
+        </p:txBody>
+      </p:sp>
+      <p:sp>
+        <p:nvSpPr>
+          <p:cNvPr id="2" name="Espace réservé du contenu 1"/>
+          <p:cNvSpPr>
+            <a:spLocks noGrp="1"/>
+          </p:cNvSpPr>
+          <p:nvPr>
+            <p:ph idx="1"/>
+          </p:nvPr>
+        </p:nvSpPr>
+        <p:spPr>
+          <a:xfrm>
+            <a:off x="739774" y="2060848"/>
+            <a:ext cx="8080697" cy="4464496"/>
+          </a:xfrm>
+        </p:spPr>
+        <p:txBody>
+          <a:bodyPr>
+            <a:normAutofit/>
+          </a:bodyPr>
+          <a:lstStyle/>
+          <a:p>
+            <a:r>
+              <a:rPr lang="fr-FR" dirty="0" smtClean="0"/>
+              <a:t>Le rapport des résultats</a:t>
+            </a:r>
+            <a:endParaRPr lang="fr-FR" dirty="0" smtClean="0"/>
+          </a:p>
+          <a:p>
+            <a:pPr lvl="1"/>
+            <a:r>
+              <a:rPr lang="fr-FR" dirty="0" smtClean="0"/>
+              <a:t>Une fois identifié, le biologiste demande la génération d’un rapport. Cela crée un fichier au format csv. Directement utilisable par </a:t>
+            </a:r>
+            <a:r>
+              <a:rPr lang="fr-FR" dirty="0" smtClean="0"/>
+              <a:t>INNOPHYT.</a:t>
+            </a:r>
             <a:endParaRPr lang="fr-FR" dirty="0"/>
           </a:p>
         </p:txBody>
@@ -5220,13 +6940,154 @@
     </p:spTree>
     <p:extLst>
       <p:ext uri="{BB962C8B-B14F-4D97-AF65-F5344CB8AC3E}">
-        <p14:creationId xmlns:p14="http://schemas.microsoft.com/office/powerpoint/2010/main" val="2475473505"/>
+        <p14:creationId xmlns:p14="http://schemas.microsoft.com/office/powerpoint/2010/main" val="248352282"/>
       </p:ext>
     </p:extLst>
   </p:cSld>
   <p:clrMapOvr>
     <a:masterClrMapping/>
   </p:clrMapOvr>
+  <p:transition advTm="10000">
+    <p:fade thruBlk="1"/>
+  </p:transition>
+  <p:timing>
+    <p:tnLst>
+      <p:par>
+        <p:cTn id="1" dur="indefinite" restart="never" nodeType="tmRoot"/>
+      </p:par>
+    </p:tnLst>
+  </p:timing>
+</p:sld>
+</file>
+
+<file path=ppt/slides/slide9.xml><?xml version="1.0" encoding="utf-8"?>
+<p:sld xmlns:a="http://schemas.openxmlformats.org/drawingml/2006/main" xmlns:r="http://schemas.openxmlformats.org/officeDocument/2006/relationships" xmlns:p="http://schemas.openxmlformats.org/presentationml/2006/main">
+  <p:cSld>
+    <p:spTree>
+      <p:nvGrpSpPr>
+        <p:cNvPr id="1" name=""/>
+        <p:cNvGrpSpPr/>
+        <p:nvPr/>
+      </p:nvGrpSpPr>
+      <p:grpSpPr>
+        <a:xfrm>
+          <a:off x="0" y="0"/>
+          <a:ext cx="0" cy="0"/>
+          <a:chOff x="0" y="0"/>
+          <a:chExt cx="0" cy="0"/>
+        </a:xfrm>
+      </p:grpSpPr>
+      <p:sp>
+        <p:nvSpPr>
+          <p:cNvPr id="15362" name="Titre 1"/>
+          <p:cNvSpPr>
+            <a:spLocks noGrp="1"/>
+          </p:cNvSpPr>
+          <p:nvPr>
+            <p:ph type="title"/>
+          </p:nvPr>
+        </p:nvSpPr>
+        <p:spPr>
+          <a:xfrm>
+            <a:off x="612775" y="142875"/>
+            <a:ext cx="8153400" cy="642938"/>
+          </a:xfrm>
+        </p:spPr>
+        <p:txBody>
+          <a:bodyPr/>
+          <a:lstStyle/>
+          <a:p>
+            <a:pPr eaLnBrk="1" hangingPunct="1"/>
+            <a:r>
+              <a:rPr lang="fr-FR" dirty="0" smtClean="0"/>
+              <a:t>II. Application mobile (5)</a:t>
+            </a:r>
+            <a:endParaRPr lang="fr-FR" dirty="0" smtClean="0"/>
+          </a:p>
+        </p:txBody>
+      </p:sp>
+      <p:sp>
+        <p:nvSpPr>
+          <p:cNvPr id="3" name="Espace réservé du numéro de diapositive 2"/>
+          <p:cNvSpPr>
+            <a:spLocks noGrp="1"/>
+          </p:cNvSpPr>
+          <p:nvPr>
+            <p:ph type="sldNum" sz="quarter" idx="12"/>
+          </p:nvPr>
+        </p:nvSpPr>
+        <p:spPr/>
+        <p:txBody>
+          <a:bodyPr>
+            <a:normAutofit/>
+          </a:bodyPr>
+          <a:lstStyle/>
+          <a:p>
+            <a:pPr>
+              <a:defRPr/>
+            </a:pPr>
+            <a:fld id="{27D126A1-CB39-4EFE-8C38-F40292B1AFFB}" type="slidenum">
+              <a:rPr lang="fr-FR"/>
+              <a:pPr>
+                <a:defRPr/>
+              </a:pPr>
+              <a:t>9</a:t>
+            </a:fld>
+            <a:endParaRPr lang="fr-FR"/>
+          </a:p>
+        </p:txBody>
+      </p:sp>
+      <p:sp>
+        <p:nvSpPr>
+          <p:cNvPr id="2" name="Espace réservé du contenu 1"/>
+          <p:cNvSpPr>
+            <a:spLocks noGrp="1"/>
+          </p:cNvSpPr>
+          <p:nvPr>
+            <p:ph idx="1"/>
+          </p:nvPr>
+        </p:nvSpPr>
+        <p:spPr>
+          <a:xfrm>
+            <a:off x="179512" y="2996952"/>
+            <a:ext cx="8640959" cy="1440160"/>
+          </a:xfrm>
+        </p:spPr>
+        <p:txBody>
+          <a:bodyPr>
+            <a:normAutofit/>
+          </a:bodyPr>
+          <a:lstStyle/>
+          <a:p>
+            <a:pPr algn="ctr"/>
+            <a:r>
+              <a:rPr lang="fr-FR" sz="5400" dirty="0" smtClean="0"/>
+              <a:t>Démonstration</a:t>
+            </a:r>
+            <a:endParaRPr lang="fr-FR" sz="5400" dirty="0"/>
+          </a:p>
+        </p:txBody>
+      </p:sp>
+    </p:spTree>
+    <p:extLst>
+      <p:ext uri="{BB962C8B-B14F-4D97-AF65-F5344CB8AC3E}">
+        <p14:creationId xmlns:p14="http://schemas.microsoft.com/office/powerpoint/2010/main" val="162602963"/>
+      </p:ext>
+    </p:extLst>
+  </p:cSld>
+  <p:clrMapOvr>
+    <a:masterClrMapping/>
+  </p:clrMapOvr>
+  <p:transition advTm="10000">
+    <p:fade thruBlk="1"/>
+  </p:transition>
+  <p:timing>
+    <p:tnLst>
+      <p:par>
+        <p:cTn id="1" dur="indefinite" restart="never" nodeType="tmRoot"/>
+      </p:par>
+    </p:tnLst>
+  </p:timing>
 </p:sld>
 </file>
 
@@ -5762,24 +7623,6 @@
 </file>
 
 <file path=customXml/item1.xml><?xml version="1.0" encoding="utf-8"?>
-<?mso-contentType ?>
-<FormTemplates xmlns="http://schemas.microsoft.com/sharepoint/v3/contenttype/forms">
-  <Display>DocumentLibraryForm</Display>
-  <Edit>DocumentLibraryForm</Edit>
-  <New>DocumentLibraryForm</New>
-</FormTemplates>
-</file>
-
-<file path=customXml/item2.xml><?xml version="1.0" encoding="utf-8"?>
-<p:properties xmlns:p="http://schemas.microsoft.com/office/2006/metadata/properties" xmlns:xsi="http://www.w3.org/2001/XMLSchema-instance">
-  <documentManagement>
-    <PublishingExpirationDate xmlns="http://schemas.microsoft.com/sharepoint/v3" xsi:nil="true"/>
-    <PublishingStartDate xmlns="http://schemas.microsoft.com/sharepoint/v3" xsi:nil="true"/>
-  </documentManagement>
-</p:properties>
-</file>
-
-<file path=customXml/item3.xml><?xml version="1.0" encoding="utf-8"?>
 <ct:contentTypeSchema xmlns:ct="http://schemas.microsoft.com/office/2006/metadata/contentType" xmlns:ma="http://schemas.microsoft.com/office/2006/metadata/properties/metaAttributes" ct:_="" ma:_="" ma:contentTypeName="Document" ma:contentTypeID="0x01010012D44DC01BD547408129FA5BDDA50BAB" ma:contentTypeVersion="1" ma:contentTypeDescription="Crée un document." ma:contentTypeScope="" ma:versionID="3a3d02b93b774ab428db4a51b5a82cb3">
   <xsd:schema xmlns:xsd="http://www.w3.org/2001/XMLSchema" xmlns:p="http://schemas.microsoft.com/office/2006/metadata/properties" xmlns:ns1="http://schemas.microsoft.com/sharepoint/v3" targetNamespace="http://schemas.microsoft.com/office/2006/metadata/properties" ma:root="true" ma:fieldsID="ee565551e1a1637f9df0223e78db73bd" ns1:_="">
     <xsd:import namespace="http://schemas.microsoft.com/sharepoint/v3"/>
@@ -5845,10 +7688,37 @@
 </ct:contentTypeSchema>
 </file>
 
+<file path=customXml/item2.xml><?xml version="1.0" encoding="utf-8"?>
+<p:properties xmlns:p="http://schemas.microsoft.com/office/2006/metadata/properties" xmlns:xsi="http://www.w3.org/2001/XMLSchema-instance">
+  <documentManagement>
+    <PublishingExpirationDate xmlns="http://schemas.microsoft.com/sharepoint/v3" xsi:nil="true"/>
+    <PublishingStartDate xmlns="http://schemas.microsoft.com/sharepoint/v3" xsi:nil="true"/>
+  </documentManagement>
+</p:properties>
+</file>
+
+<file path=customXml/item3.xml><?xml version="1.0" encoding="utf-8"?>
+<?mso-contentType ?>
+<FormTemplates xmlns="http://schemas.microsoft.com/sharepoint/v3/contenttype/forms">
+  <Display>DocumentLibraryForm</Display>
+  <Edit>DocumentLibraryForm</Edit>
+  <New>DocumentLibraryForm</New>
+</FormTemplates>
+</file>
+
 <file path=customXml/itemProps1.xml><?xml version="1.0" encoding="utf-8"?>
-<ds:datastoreItem xmlns:ds="http://schemas.openxmlformats.org/officeDocument/2006/customXml" ds:itemID="{B5E2A04F-38EF-4280-A0EA-8D3BBB810614}">
+<ds:datastoreItem xmlns:ds="http://schemas.openxmlformats.org/officeDocument/2006/customXml" ds:itemID="{4D097A1F-F8BB-41AA-AEB7-CE8EEA3CD59C}">
   <ds:schemaRefs>
-    <ds:schemaRef ds:uri="http://schemas.microsoft.com/sharepoint/v3/contenttype/forms"/>
+    <ds:schemaRef ds:uri="http://schemas.microsoft.com/office/2006/metadata/contentType"/>
+    <ds:schemaRef ds:uri="http://schemas.microsoft.com/office/2006/metadata/properties/metaAttributes"/>
+    <ds:schemaRef ds:uri="http://www.w3.org/2001/XMLSchema"/>
+    <ds:schemaRef ds:uri="http://schemas.microsoft.com/office/2006/metadata/properties"/>
+    <ds:schemaRef ds:uri="http://schemas.microsoft.com/sharepoint/v3"/>
+    <ds:schemaRef ds:uri="http://schemas.microsoft.com/office/2006/documentManagement/types"/>
+    <ds:schemaRef ds:uri="http://schemas.openxmlformats.org/package/2006/metadata/core-properties"/>
+    <ds:schemaRef ds:uri="http://purl.org/dc/elements/1.1/"/>
+    <ds:schemaRef ds:uri="http://purl.org/dc/terms/"/>
+    <ds:schemaRef ds:uri="http://schemas.microsoft.com/office/internal/2005/internalDocumentation"/>
   </ds:schemaRefs>
 </ds:datastoreItem>
 </file>
@@ -5863,18 +7733,9 @@
 </file>
 
 <file path=customXml/itemProps3.xml><?xml version="1.0" encoding="utf-8"?>
-<ds:datastoreItem xmlns:ds="http://schemas.openxmlformats.org/officeDocument/2006/customXml" ds:itemID="{4D097A1F-F8BB-41AA-AEB7-CE8EEA3CD59C}">
+<ds:datastoreItem xmlns:ds="http://schemas.openxmlformats.org/officeDocument/2006/customXml" ds:itemID="{B5E2A04F-38EF-4280-A0EA-8D3BBB810614}">
   <ds:schemaRefs>
-    <ds:schemaRef ds:uri="http://schemas.microsoft.com/office/2006/metadata/contentType"/>
-    <ds:schemaRef ds:uri="http://schemas.microsoft.com/office/2006/metadata/properties/metaAttributes"/>
-    <ds:schemaRef ds:uri="http://www.w3.org/2001/XMLSchema"/>
-    <ds:schemaRef ds:uri="http://schemas.microsoft.com/office/2006/metadata/properties"/>
-    <ds:schemaRef ds:uri="http://schemas.microsoft.com/sharepoint/v3"/>
-    <ds:schemaRef ds:uri="http://schemas.microsoft.com/office/2006/documentManagement/types"/>
-    <ds:schemaRef ds:uri="http://schemas.openxmlformats.org/package/2006/metadata/core-properties"/>
-    <ds:schemaRef ds:uri="http://purl.org/dc/elements/1.1/"/>
-    <ds:schemaRef ds:uri="http://purl.org/dc/terms/"/>
-    <ds:schemaRef ds:uri="http://schemas.microsoft.com/office/internal/2005/internalDocumentation"/>
+    <ds:schemaRef ds:uri="http://schemas.microsoft.com/sharepoint/v3/contenttype/forms"/>
   </ds:schemaRefs>
 </ds:datastoreItem>
 </file>
</xml_diff>